<commit_message>
Update demo presentation with content refinements and safety prompt
- Add confirmation prompt before regenerating to protect manual edits
- Reorder slides: Live Demo now last for smoother demo workflow
- Add comment boxes and asterisks for presenter annotations
- Improve line spacing and layout across multiple slides
- Move Heliocentric chart to top of analysis tools with separator

Co-Authored-By: Claude Opus 4.5 <noreply@anthropic.com>
</commit_message>
<xml_diff>
--- a/presentations/NEOlyzer_Demo.pptx
+++ b/presentations/NEOlyzer_Demo.pptx
@@ -3165,7 +3165,7 @@
             <a:pPr algn="ctr">
               <a:defRPr sz="3600" b="0">
                 <a:solidFill>
-                  <a:srgbClr val="4A6FA5"/>
+                  <a:srgbClr val="8AB4D9"/>
                 </a:solidFill>
               </a:defRPr>
             </a:pPr>
@@ -3278,7 +3278,7 @@
             <a:pPr algn="ctr">
               <a:defRPr sz="2200" b="0">
                 <a:solidFill>
-                  <a:srgbClr val="4A6FA5"/>
+                  <a:srgbClr val="8AB4D9"/>
                 </a:solidFill>
               </a:defRPr>
             </a:pPr>
@@ -3348,7 +3348,7 @@
             <a:pPr algn="ctr">
               <a:defRPr sz="2200" b="0">
                 <a:solidFill>
-                  <a:srgbClr val="4A6FA5"/>
+                  <a:srgbClr val="8AB4D9"/>
                 </a:solidFill>
               </a:defRPr>
             </a:pPr>
@@ -3439,7 +3439,7 @@
     <p:bg>
       <p:bgPr>
         <a:solidFill>
-          <a:srgbClr val="1A235B"/>
+          <a:srgbClr val="2D3E83"/>
         </a:solidFill>
         <a:effectLst/>
       </p:bgPr>
@@ -3459,7 +3459,7 @@
         </p:nvSpPr>
         <p:spPr>
           <a:xfrm>
-            <a:off x="457200" y="274320"/>
+            <a:off x="457200" y="2286000"/>
             <a:ext cx="11277295" cy="1097280"/>
           </a:xfrm>
           <a:prstGeom prst="rect">
@@ -3474,14 +3474,14 @@
           <a:lstStyle/>
           <a:p>
             <a:pPr algn="ctr">
-              <a:defRPr sz="4400" b="1">
+              <a:defRPr sz="6000" b="1">
                 <a:solidFill>
                   <a:srgbClr val="FFFFFF"/>
                 </a:solidFill>
               </a:defRPr>
             </a:pPr>
             <a:r>
-              <a:t>Future Directions</a:t>
+              <a:t>Live Demo</a:t>
             </a:r>
           </a:p>
         </p:txBody>
@@ -3494,7 +3494,7 @@
         </p:nvSpPr>
         <p:spPr>
           <a:xfrm>
-            <a:off x="3657600" y="914400"/>
+            <a:off x="3657600" y="3108960"/>
             <a:ext cx="4876495" cy="50800"/>
           </a:xfrm>
           <a:prstGeom prst="rect">
@@ -3537,8 +3537,8 @@
         </p:nvSpPr>
         <p:spPr>
           <a:xfrm>
-            <a:off x="685800" y="1371600"/>
-            <a:ext cx="10515600" cy="4572000"/>
+            <a:off x="685800" y="3840480"/>
+            <a:ext cx="10820095" cy="4572000"/>
           </a:xfrm>
           <a:prstGeom prst="rect">
             <a:avLst/>
@@ -3551,111 +3551,28 @@
           </a:bodyPr>
           <a:lstStyle/>
           <a:p>
-            <a:pPr>
-              <a:defRPr sz="2600">
-                <a:solidFill>
-                  <a:srgbClr val="FFFFFF"/>
-                </a:solidFill>
-              </a:defRPr>
-            </a:pPr>
-            <a:r>
-              <a:t>  Performance optimization for 100,000+ NEOs (catalog growing rapidly)</a:t>
-            </a:r>
-          </a:p>
-          <a:p>
-            <a:pPr>
-              <a:defRPr sz="2600">
-                <a:solidFill>
-                  <a:srgbClr val="FFFFFF"/>
-                </a:solidFill>
-              </a:defRPr>
-            </a:pPr>
-            <a:r>
-              <a:t>  Database schema normalization as features expand</a:t>
-            </a:r>
-          </a:p>
-          <a:p>
-            <a:pPr>
-              <a:defRPr sz="2600">
-                <a:solidFill>
-                  <a:srgbClr val="FFFFFF"/>
-                </a:solidFill>
-              </a:defRPr>
-            </a:pPr>
-            <a:r>
-              <a:t>  Additional observational planning modes</a:t>
-            </a:r>
-          </a:p>
-          <a:p>
-            <a:pPr>
-              <a:defRPr sz="2600">
-                <a:solidFill>
-                  <a:srgbClr val="FFFFFF"/>
-                </a:solidFill>
-              </a:defRPr>
-            </a:pPr>
-            <a:r>
-              <a:t>  Enhanced scripted playback for demonstrations</a:t>
-            </a:r>
-          </a:p>
-          <a:p>
-            <a:pPr>
-              <a:defRPr sz="2600">
-                <a:solidFill>
-                  <a:srgbClr val="FFFFFF"/>
-                </a:solidFill>
-              </a:defRPr>
-            </a:pPr>
-            <a:r>
-              <a:t>  Community feedback and feature requests welcome</a:t>
-            </a:r>
-          </a:p>
-        </p:txBody>
-      </p:sp>
-      <p:sp>
-        <p:nvSpPr>
-          <p:cNvPr id="5" name="TextBox 4"/>
-          <p:cNvSpPr txBox="1"/>
-          <p:nvPr/>
-        </p:nvSpPr>
-        <p:spPr>
-          <a:xfrm>
-            <a:off x="685800" y="4754880"/>
-            <a:ext cx="10515600" cy="548640"/>
-          </a:xfrm>
-          <a:prstGeom prst="rect">
-            <a:avLst/>
-          </a:prstGeom>
-          <a:noFill/>
-        </p:spPr>
-        <p:txBody>
-          <a:bodyPr wrap="none">
-            <a:spAutoFit/>
-          </a:bodyPr>
-          <a:lstStyle/>
-          <a:p>
-            <a:pPr>
-              <a:defRPr sz="2400" b="1">
-                <a:solidFill>
-                  <a:srgbClr val="FFC107"/>
-                </a:solidFill>
-              </a:defRPr>
-            </a:pPr>
-            <a:r>
-              <a:t>Contact: rseaman@arizona.edu</a:t>
-            </a:r>
-          </a:p>
-        </p:txBody>
-      </p:sp>
-      <p:sp>
-        <p:nvSpPr>
-          <p:cNvPr id="6" name="Oval 5"/>
+            <a:pPr algn="ctr">
+              <a:defRPr sz="2800">
+                <a:solidFill>
+                  <a:srgbClr val="8AB4D9"/>
+                </a:solidFill>
+              </a:defRPr>
+            </a:pPr>
+            <a:r>
+              <a:t>Projections  |  Filtering  |  Catalog Blinking  |  Animation</a:t>
+            </a:r>
+          </a:p>
+        </p:txBody>
+      </p:sp>
+      <p:sp>
+        <p:nvSpPr>
+          <p:cNvPr id="5" name="Oval 4"/>
           <p:cNvSpPr/>
           <p:nvPr/>
         </p:nvSpPr>
         <p:spPr>
           <a:xfrm>
-            <a:off x="9111996" y="4082796"/>
+            <a:off x="9416491" y="4082796"/>
             <a:ext cx="1892807" cy="1892807"/>
           </a:xfrm>
           <a:prstGeom prst="ellipse">
@@ -3692,7 +3609,7 @@
       </p:sp>
       <p:pic>
         <p:nvPicPr>
-          <p:cNvPr id="7" name="Picture 6" descr="CSS_logo_transparent.png"/>
+          <p:cNvPr id="6" name="Picture 5" descr="CSS_logo_transparent.png"/>
           <p:cNvPicPr>
             <a:picLocks noChangeAspect="1"/>
           </p:cNvPicPr>
@@ -3706,7 +3623,7 @@
         </p:blipFill>
         <p:spPr>
           <a:xfrm>
-            <a:off x="9235440" y="4206240"/>
+            <a:off x="9539935" y="4206240"/>
             <a:ext cx="1645920" cy="1645920"/>
           </a:xfrm>
           <a:prstGeom prst="rect">
@@ -3890,7 +3807,7 @@
             <a:pPr>
               <a:defRPr sz="2200">
                 <a:solidFill>
-                  <a:srgbClr val="4A6FA5"/>
+                  <a:srgbClr val="8AB4D9"/>
                 </a:solidFill>
               </a:defRPr>
             </a:pPr>
@@ -3900,11 +3817,11 @@
             <a:br/>
             <a:br/>
             <a:r>
-              <a:t>NEOlyzer itself was developed through AI-assisted programming,</a:t>
+              <a:t>NEOlyzer itself was developed through AI-assisted programming, achieving</a:t>
             </a:r>
             <a:br/>
             <a:r>
-              <a:t>achieving a Minimum Viable Product in under 2 weeks.</a:t>
+              <a:t>a Minimum Viable Product in a few days. Total effort was about two weeks.</a:t>
             </a:r>
           </a:p>
         </p:txBody>
@@ -4036,6 +3953,9 @@
           <a:lstStyle/>
           <a:p>
             <a:pPr>
+              <a:lnSpc>
+                <a:spcPct val="150000"/>
+              </a:lnSpc>
               <a:defRPr sz="2800">
                 <a:solidFill>
                   <a:srgbClr val="FFFFFF"/>
@@ -4048,6 +3968,9 @@
           </a:p>
           <a:p>
             <a:pPr>
+              <a:lnSpc>
+                <a:spcPct val="150000"/>
+              </a:lnSpc>
               <a:defRPr sz="2800">
                 <a:solidFill>
                   <a:srgbClr val="FFFFFF"/>
@@ -4055,11 +3978,14 @@
               </a:defRPr>
             </a:pPr>
             <a:r>
-              <a:t>  Supports Planetary Defense research and observation planning</a:t>
-            </a:r>
-          </a:p>
-          <a:p>
-            <a:pPr>
+              <a:t>  Displays 40,000+ NEOs with smooth real-time animation</a:t>
+            </a:r>
+          </a:p>
+          <a:p>
+            <a:pPr>
+              <a:lnSpc>
+                <a:spcPct val="150000"/>
+              </a:lnSpc>
               <a:defRPr sz="2800">
                 <a:solidFill>
                   <a:srgbClr val="FFFFFF"/>
@@ -4067,11 +3993,14 @@
               </a:defRPr>
             </a:pPr>
             <a:r>
-              <a:t>  Displays 40,000+ NEOs with smooth real-time animation</a:t>
-            </a:r>
-          </a:p>
-          <a:p>
-            <a:pPr>
+              <a:t>  Time range spanning 1550-2650 (using JPL DE440 ephemeris)</a:t>
+            </a:r>
+          </a:p>
+          <a:p>
+            <a:pPr>
+              <a:lnSpc>
+                <a:spcPct val="150000"/>
+              </a:lnSpc>
               <a:defRPr sz="2800">
                 <a:solidFill>
                   <a:srgbClr val="FFFFFF"/>
@@ -4079,11 +4008,14 @@
               </a:defRPr>
             </a:pPr>
             <a:r>
-              <a:t>  Time range spanning 1550-2650 (using JPL DE440 ephemeris)</a:t>
-            </a:r>
-          </a:p>
-          <a:p>
-            <a:pPr>
+              <a:t>  Cross-platform: macOS, Linux, Windows (via WSL)</a:t>
+            </a:r>
+          </a:p>
+          <a:p>
+            <a:pPr>
+              <a:lnSpc>
+                <a:spcPct val="150000"/>
+              </a:lnSpc>
               <a:defRPr sz="2800">
                 <a:solidFill>
                   <a:srgbClr val="FFFFFF"/>
@@ -4091,19 +4023,96 @@
               </a:defRPr>
             </a:pPr>
             <a:r>
-              <a:t>  Cross-platform: macOS, Linux, Windows (via WSL)</a:t>
-            </a:r>
-          </a:p>
-          <a:p>
-            <a:pPr>
-              <a:defRPr sz="2800">
-                <a:solidFill>
-                  <a:srgbClr val="FFFFFF"/>
-                </a:solidFill>
-              </a:defRPr>
-            </a:pPr>
-            <a:r>
               <a:t>  Built with Python, PyQt6, matplotlib, Skyfield, SQLite</a:t>
+            </a:r>
+          </a:p>
+        </p:txBody>
+      </p:sp>
+      <p:sp>
+        <p:nvSpPr>
+          <p:cNvPr id="5" name="TextBox 4"/>
+          <p:cNvSpPr txBox="1"/>
+          <p:nvPr/>
+        </p:nvSpPr>
+        <p:spPr>
+          <a:xfrm>
+            <a:off x="9784080" y="2788920"/>
+            <a:ext cx="548640" cy="548640"/>
+          </a:xfrm>
+          <a:prstGeom prst="rect">
+            <a:avLst/>
+          </a:prstGeom>
+          <a:noFill/>
+        </p:spPr>
+        <p:txBody>
+          <a:bodyPr wrap="none">
+            <a:spAutoFit/>
+          </a:bodyPr>
+          <a:lstStyle/>
+          <a:p>
+            <a:pPr>
+              <a:defRPr sz="4400" b="1">
+                <a:solidFill>
+                  <a:srgbClr val="FFC107"/>
+                </a:solidFill>
+              </a:defRPr>
+            </a:pPr>
+            <a:r>
+              <a:t>*</a:t>
+            </a:r>
+          </a:p>
+        </p:txBody>
+      </p:sp>
+      <p:sp>
+        <p:nvSpPr>
+          <p:cNvPr id="6" name="Rounded Rectangle 5"/>
+          <p:cNvSpPr/>
+          <p:nvPr/>
+        </p:nvSpPr>
+        <p:spPr>
+          <a:xfrm>
+            <a:off x="2898648" y="5029200"/>
+            <a:ext cx="6400800" cy="914400"/>
+          </a:xfrm>
+          <a:prstGeom prst="roundRect">
+            <a:avLst/>
+          </a:prstGeom>
+          <a:solidFill>
+            <a:srgbClr val="D0E8F8"/>
+          </a:solidFill>
+          <a:ln w="38100">
+            <a:solidFill>
+              <a:srgbClr val="FFC107"/>
+            </a:solidFill>
+          </a:ln>
+        </p:spPr>
+        <p:style>
+          <a:lnRef idx="1">
+            <a:schemeClr val="accent1"/>
+          </a:lnRef>
+          <a:fillRef idx="3">
+            <a:schemeClr val="accent1"/>
+          </a:fillRef>
+          <a:effectRef idx="2">
+            <a:schemeClr val="accent1"/>
+          </a:effectRef>
+          <a:fontRef idx="minor">
+            <a:schemeClr val="lt1"/>
+          </a:fontRef>
+        </p:style>
+        <p:txBody>
+          <a:bodyPr rtlCol="0" anchor="ctr" wrap="square"/>
+          <a:lstStyle/>
+          <a:p>
+            <a:pPr algn="ctr">
+              <a:defRPr sz="2200">
+                <a:solidFill>
+                  <a:srgbClr val="1A235B"/>
+                </a:solidFill>
+              </a:defRPr>
+            </a:pPr>
+            <a:r>
+              <a:t>Orbits are not currently being integrated</a:t>
             </a:r>
           </a:p>
         </p:txBody>
@@ -4432,7 +4441,7 @@
         </p:nvSpPr>
         <p:spPr>
           <a:xfrm>
-            <a:off x="685800" y="4114800"/>
+            <a:off x="685800" y="3657600"/>
             <a:ext cx="10515600" cy="548640"/>
           </a:xfrm>
           <a:prstGeom prst="rect">
@@ -4467,8 +4476,8 @@
         </p:nvSpPr>
         <p:spPr>
           <a:xfrm>
-            <a:off x="685800" y="4663440"/>
-            <a:ext cx="10820095" cy="4572000"/>
+            <a:off x="685800" y="4206240"/>
+            <a:ext cx="10515600" cy="4572000"/>
           </a:xfrm>
           <a:prstGeom prst="rect">
             <a:avLst/>
@@ -4484,12 +4493,125 @@
             <a:pPr>
               <a:defRPr sz="2200">
                 <a:solidFill>
-                  <a:srgbClr val="4A6FA5"/>
-                </a:solidFill>
-              </a:defRPr>
-            </a:pPr>
-            <a:r>
-              <a:t>Variable playback rates (hours/days/months per second)  |  Forward and backward playback  |  ~10 FPS with 40,000+ objects</a:t>
+                  <a:srgbClr val="8AB4D9"/>
+                </a:solidFill>
+              </a:defRPr>
+            </a:pPr>
+            <a:r>
+              <a:t>  Variable playback rates (hours/days/months per second)</a:t>
+            </a:r>
+          </a:p>
+          <a:p>
+            <a:pPr>
+              <a:defRPr sz="2200">
+                <a:solidFill>
+                  <a:srgbClr val="8AB4D9"/>
+                </a:solidFill>
+              </a:defRPr>
+            </a:pPr>
+            <a:r>
+              <a:t>  Forward and backward playback</a:t>
+            </a:r>
+          </a:p>
+          <a:p>
+            <a:pPr>
+              <a:defRPr sz="2200">
+                <a:solidFill>
+                  <a:srgbClr val="8AB4D9"/>
+                </a:solidFill>
+              </a:defRPr>
+            </a:pPr>
+            <a:r>
+              <a:t>  ~10 FPS with 40,000+ objects</a:t>
+            </a:r>
+          </a:p>
+        </p:txBody>
+      </p:sp>
+      <p:sp>
+        <p:nvSpPr>
+          <p:cNvPr id="10" name="TextBox 9"/>
+          <p:cNvSpPr txBox="1"/>
+          <p:nvPr/>
+        </p:nvSpPr>
+        <p:spPr>
+          <a:xfrm>
+            <a:off x="4206240" y="4846320"/>
+            <a:ext cx="457200" cy="457200"/>
+          </a:xfrm>
+          <a:prstGeom prst="rect">
+            <a:avLst/>
+          </a:prstGeom>
+          <a:noFill/>
+        </p:spPr>
+        <p:txBody>
+          <a:bodyPr wrap="none">
+            <a:spAutoFit/>
+          </a:bodyPr>
+          <a:lstStyle/>
+          <a:p>
+            <a:pPr>
+              <a:defRPr sz="3600" b="1">
+                <a:solidFill>
+                  <a:srgbClr val="FFC107"/>
+                </a:solidFill>
+              </a:defRPr>
+            </a:pPr>
+            <a:r>
+              <a:t>*</a:t>
+            </a:r>
+          </a:p>
+        </p:txBody>
+      </p:sp>
+      <p:sp>
+        <p:nvSpPr>
+          <p:cNvPr id="11" name="Rounded Rectangle 10"/>
+          <p:cNvSpPr/>
+          <p:nvPr/>
+        </p:nvSpPr>
+        <p:spPr>
+          <a:xfrm>
+            <a:off x="5943600" y="5760720"/>
+            <a:ext cx="5486400" cy="731520"/>
+          </a:xfrm>
+          <a:prstGeom prst="roundRect">
+            <a:avLst/>
+          </a:prstGeom>
+          <a:solidFill>
+            <a:srgbClr val="D0E8F8"/>
+          </a:solidFill>
+          <a:ln w="38100">
+            <a:solidFill>
+              <a:srgbClr val="FFC107"/>
+            </a:solidFill>
+          </a:ln>
+        </p:spPr>
+        <p:style>
+          <a:lnRef idx="1">
+            <a:schemeClr val="accent1"/>
+          </a:lnRef>
+          <a:fillRef idx="3">
+            <a:schemeClr val="accent1"/>
+          </a:fillRef>
+          <a:effectRef idx="2">
+            <a:schemeClr val="accent1"/>
+          </a:effectRef>
+          <a:fontRef idx="minor">
+            <a:schemeClr val="lt1"/>
+          </a:fontRef>
+        </p:style>
+        <p:txBody>
+          <a:bodyPr rtlCol="0" anchor="ctr" wrap="square"/>
+          <a:lstStyle/>
+          <a:p>
+            <a:pPr algn="ctr">
+              <a:defRPr sz="2000">
+                <a:solidFill>
+                  <a:srgbClr val="1A235B"/>
+                </a:solidFill>
+              </a:defRPr>
+            </a:pPr>
+            <a:r>
+              <a:t>As permitted by your hardware and OS</a:t>
             </a:r>
           </a:p>
         </p:txBody>
@@ -5043,6 +5165,9 @@
           <a:lstStyle/>
           <a:p>
             <a:pPr>
+              <a:lnSpc>
+                <a:spcPct val="150000"/>
+              </a:lnSpc>
               <a:defRPr sz="2600">
                 <a:solidFill>
                   <a:srgbClr val="FFFFFF"/>
@@ -5050,11 +5175,95 @@
               </a:defRPr>
             </a:pPr>
             <a:r>
+              <a:t>  Heliocentric Polar Chart - Sun-centered ecliptic view</a:t>
+            </a:r>
+          </a:p>
+        </p:txBody>
+      </p:sp>
+      <p:sp>
+        <p:nvSpPr>
+          <p:cNvPr id="5" name="Rectangle 4"/>
+          <p:cNvSpPr/>
+          <p:nvPr/>
+        </p:nvSpPr>
+        <p:spPr>
+          <a:xfrm>
+            <a:off x="685800" y="2103120"/>
+            <a:ext cx="10515600" cy="25400"/>
+          </a:xfrm>
+          <a:prstGeom prst="rect">
+            <a:avLst/>
+          </a:prstGeom>
+          <a:solidFill>
+            <a:srgbClr val="FFC107"/>
+          </a:solidFill>
+          <a:ln>
+            <a:noFill/>
+          </a:ln>
+        </p:spPr>
+        <p:style>
+          <a:lnRef idx="1">
+            <a:schemeClr val="accent1"/>
+          </a:lnRef>
+          <a:fillRef idx="3">
+            <a:schemeClr val="accent1"/>
+          </a:fillRef>
+          <a:effectRef idx="2">
+            <a:schemeClr val="accent1"/>
+          </a:effectRef>
+          <a:fontRef idx="minor">
+            <a:schemeClr val="lt1"/>
+          </a:fontRef>
+        </p:style>
+        <p:txBody>
+          <a:bodyPr rtlCol="0" anchor="ctr"/>
+          <a:lstStyle/>
+          <a:p>
+            <a:pPr algn="ctr"/>
+          </a:p>
+        </p:txBody>
+      </p:sp>
+      <p:sp>
+        <p:nvSpPr>
+          <p:cNvPr id="6" name="TextBox 5"/>
+          <p:cNvSpPr txBox="1"/>
+          <p:nvPr/>
+        </p:nvSpPr>
+        <p:spPr>
+          <a:xfrm>
+            <a:off x="685800" y="2286000"/>
+            <a:ext cx="10515600" cy="4572000"/>
+          </a:xfrm>
+          <a:prstGeom prst="rect">
+            <a:avLst/>
+          </a:prstGeom>
+          <a:noFill/>
+        </p:spPr>
+        <p:txBody>
+          <a:bodyPr wrap="square">
+            <a:spAutoFit/>
+          </a:bodyPr>
+          <a:lstStyle/>
+          <a:p>
+            <a:pPr>
+              <a:lnSpc>
+                <a:spcPct val="150000"/>
+              </a:lnSpc>
+              <a:defRPr sz="2600">
+                <a:solidFill>
+                  <a:srgbClr val="FFFFFF"/>
+                </a:solidFill>
+              </a:defRPr>
+            </a:pPr>
+            <a:r>
               <a:t>  MOID vs H Magnitude - Visualize Potentially Hazardous Asteroids</a:t>
             </a:r>
           </a:p>
           <a:p>
             <a:pPr>
+              <a:lnSpc>
+                <a:spcPct val="150000"/>
+              </a:lnSpc>
               <a:defRPr sz="2600">
                 <a:solidFill>
                   <a:srgbClr val="FFFFFF"/>
@@ -5067,6 +5276,9 @@
           </a:p>
           <a:p>
             <a:pPr>
+              <a:lnSpc>
+                <a:spcPct val="150000"/>
+              </a:lnSpc>
               <a:defRPr sz="2600">
                 <a:solidFill>
                   <a:srgbClr val="FFFFFF"/>
@@ -5079,6 +5291,9 @@
           </a:p>
           <a:p>
             <a:pPr>
+              <a:lnSpc>
+                <a:spcPct val="150000"/>
+              </a:lnSpc>
               <a:defRPr sz="2600">
                 <a:solidFill>
                   <a:srgbClr val="FFFFFF"/>
@@ -5091,6 +5306,9 @@
           </a:p>
           <a:p>
             <a:pPr>
+              <a:lnSpc>
+                <a:spcPct val="150000"/>
+              </a:lnSpc>
               <a:defRPr sz="2600">
                 <a:solidFill>
                   <a:srgbClr val="FFFFFF"/>
@@ -5101,16 +5319,93 @@
               <a:t>  Lunar Phases Calendar - CLN tracking for observation scheduling</a:t>
             </a:r>
           </a:p>
-          <a:p>
-            <a:pPr>
-              <a:defRPr sz="2600">
-                <a:solidFill>
-                  <a:srgbClr val="FFFFFF"/>
-                </a:solidFill>
-              </a:defRPr>
-            </a:pPr>
-            <a:r>
-              <a:t>  Heliocentric Polar Chart - Sun-centered ecliptic view</a:t>
+        </p:txBody>
+      </p:sp>
+      <p:sp>
+        <p:nvSpPr>
+          <p:cNvPr id="7" name="TextBox 6"/>
+          <p:cNvSpPr txBox="1"/>
+          <p:nvPr/>
+        </p:nvSpPr>
+        <p:spPr>
+          <a:xfrm>
+            <a:off x="10515600" y="2286000"/>
+            <a:ext cx="457200" cy="457200"/>
+          </a:xfrm>
+          <a:prstGeom prst="rect">
+            <a:avLst/>
+          </a:prstGeom>
+          <a:noFill/>
+        </p:spPr>
+        <p:txBody>
+          <a:bodyPr wrap="none">
+            <a:spAutoFit/>
+          </a:bodyPr>
+          <a:lstStyle/>
+          <a:p>
+            <a:pPr>
+              <a:defRPr sz="3600" b="1">
+                <a:solidFill>
+                  <a:srgbClr val="FFC107"/>
+                </a:solidFill>
+              </a:defRPr>
+            </a:pPr>
+            <a:r>
+              <a:t>*</a:t>
+            </a:r>
+          </a:p>
+        </p:txBody>
+      </p:sp>
+      <p:sp>
+        <p:nvSpPr>
+          <p:cNvPr id="8" name="Rounded Rectangle 7"/>
+          <p:cNvSpPr/>
+          <p:nvPr/>
+        </p:nvSpPr>
+        <p:spPr>
+          <a:xfrm>
+            <a:off x="3355848" y="5486400"/>
+            <a:ext cx="5486400" cy="731520"/>
+          </a:xfrm>
+          <a:prstGeom prst="roundRect">
+            <a:avLst/>
+          </a:prstGeom>
+          <a:solidFill>
+            <a:srgbClr val="D0E8F8"/>
+          </a:solidFill>
+          <a:ln w="38100">
+            <a:solidFill>
+              <a:srgbClr val="FFC107"/>
+            </a:solidFill>
+          </a:ln>
+        </p:spPr>
+        <p:style>
+          <a:lnRef idx="1">
+            <a:schemeClr val="accent1"/>
+          </a:lnRef>
+          <a:fillRef idx="3">
+            <a:schemeClr val="accent1"/>
+          </a:fillRef>
+          <a:effectRef idx="2">
+            <a:schemeClr val="accent1"/>
+          </a:effectRef>
+          <a:fontRef idx="minor">
+            <a:schemeClr val="lt1"/>
+          </a:fontRef>
+        </p:style>
+        <p:txBody>
+          <a:bodyPr rtlCol="0" anchor="ctr" wrap="square"/>
+          <a:lstStyle/>
+          <a:p>
+            <a:pPr algn="ctr">
+              <a:defRPr sz="2000">
+                <a:solidFill>
+                  <a:srgbClr val="1A235B"/>
+                </a:solidFill>
+              </a:defRPr>
+            </a:pPr>
+            <a:r>
+              <a:t>Optimizing these charts TBD</a:t>
             </a:r>
           </a:p>
         </p:txBody>
@@ -5296,7 +5591,7 @@
               </a:defRPr>
             </a:pPr>
             <a:r>
-              <a:t>  Hipparcos bright star catalog</a:t>
+              <a:t>  Bright star catalog</a:t>
             </a:r>
           </a:p>
           <a:p>
@@ -5475,7 +5770,7 @@
         <p:spPr>
           <a:xfrm>
             <a:off x="685800" y="4663440"/>
-            <a:ext cx="10820095" cy="4572000"/>
+            <a:ext cx="10515600" cy="4572000"/>
           </a:xfrm>
           <a:prstGeom prst="rect">
             <a:avLst/>
@@ -5491,12 +5786,36 @@
             <a:pPr>
               <a:defRPr sz="2200">
                 <a:solidFill>
-                  <a:srgbClr val="4A6FA5"/>
-                </a:solidFill>
-              </a:defRPr>
-            </a:pPr>
-            <a:r>
-              <a:t>Click any NEO for detailed orbital elements and discovery info  |  Shift+Click for constellation ID  |  Sortable data tables with CSV export</a:t>
+                  <a:srgbClr val="8AB4D9"/>
+                </a:solidFill>
+              </a:defRPr>
+            </a:pPr>
+            <a:r>
+              <a:t>  Click any NEO for detailed orbital elements and discovery info</a:t>
+            </a:r>
+          </a:p>
+          <a:p>
+            <a:pPr>
+              <a:defRPr sz="2200">
+                <a:solidFill>
+                  <a:srgbClr val="8AB4D9"/>
+                </a:solidFill>
+              </a:defRPr>
+            </a:pPr>
+            <a:r>
+              <a:t>  Shift+Click for constellation ID</a:t>
+            </a:r>
+          </a:p>
+          <a:p>
+            <a:pPr>
+              <a:defRPr sz="2200">
+                <a:solidFill>
+                  <a:srgbClr val="8AB4D9"/>
+                </a:solidFill>
+              </a:defRPr>
+            </a:pPr>
+            <a:r>
+              <a:t>  Sortable data tables with CSV export</a:t>
             </a:r>
           </a:p>
         </p:txBody>
@@ -5674,8 +5993,34 @@
               <a:t>     - Low precision (monthly) for extended range</a:t>
             </a:r>
           </a:p>
-          <a:p>
-            <a:pPr>
+        </p:txBody>
+      </p:sp>
+      <p:sp>
+        <p:nvSpPr>
+          <p:cNvPr id="5" name="TextBox 4"/>
+          <p:cNvSpPr txBox="1"/>
+          <p:nvPr/>
+        </p:nvSpPr>
+        <p:spPr>
+          <a:xfrm>
+            <a:off x="685800" y="3108960"/>
+            <a:ext cx="10515600" cy="4572000"/>
+          </a:xfrm>
+          <a:prstGeom prst="rect">
+            <a:avLst/>
+          </a:prstGeom>
+          <a:noFill/>
+        </p:spPr>
+        <p:txBody>
+          <a:bodyPr wrap="square">
+            <a:spAutoFit/>
+          </a:bodyPr>
+          <a:lstStyle/>
+          <a:p>
+            <a:pPr>
+              <a:lnSpc>
+                <a:spcPct val="150000"/>
+              </a:lnSpc>
               <a:defRPr sz="2400">
                 <a:solidFill>
                   <a:srgbClr val="FFFFFF"/>
@@ -5688,6 +6033,9 @@
           </a:p>
           <a:p>
             <a:pPr>
+              <a:lnSpc>
+                <a:spcPct val="150000"/>
+              </a:lnSpc>
               <a:defRPr sz="2400">
                 <a:solidFill>
                   <a:srgbClr val="FFFFFF"/>
@@ -5700,6 +6048,9 @@
           </a:p>
           <a:p>
             <a:pPr>
+              <a:lnSpc>
+                <a:spcPct val="150000"/>
+              </a:lnSpc>
               <a:defRPr sz="2400">
                 <a:solidFill>
                   <a:srgbClr val="FFFFFF"/>
@@ -5712,6 +6063,9 @@
           </a:p>
           <a:p>
             <a:pPr>
+              <a:lnSpc>
+                <a:spcPct val="150000"/>
+              </a:lnSpc>
               <a:defRPr sz="2400">
                 <a:solidFill>
                   <a:srgbClr val="FFFFFF"/>
@@ -5738,7 +6092,7 @@
     <p:bg>
       <p:bgPr>
         <a:solidFill>
-          <a:srgbClr val="2D3E83"/>
+          <a:srgbClr val="1A235B"/>
         </a:solidFill>
         <a:effectLst/>
       </p:bgPr>
@@ -5758,7 +6112,7 @@
         </p:nvSpPr>
         <p:spPr>
           <a:xfrm>
-            <a:off x="457200" y="2286000"/>
+            <a:off x="457200" y="274320"/>
             <a:ext cx="11277295" cy="1097280"/>
           </a:xfrm>
           <a:prstGeom prst="rect">
@@ -5773,14 +6127,14 @@
           <a:lstStyle/>
           <a:p>
             <a:pPr algn="ctr">
-              <a:defRPr sz="6000" b="1">
+              <a:defRPr sz="4400" b="1">
                 <a:solidFill>
                   <a:srgbClr val="FFFFFF"/>
                 </a:solidFill>
               </a:defRPr>
             </a:pPr>
             <a:r>
-              <a:t>Live Demo</a:t>
+              <a:t>Future Directions</a:t>
             </a:r>
           </a:p>
         </p:txBody>
@@ -5793,7 +6147,7 @@
         </p:nvSpPr>
         <p:spPr>
           <a:xfrm>
-            <a:off x="3657600" y="3108960"/>
+            <a:off x="3657600" y="914400"/>
             <a:ext cx="4876495" cy="50800"/>
           </a:xfrm>
           <a:prstGeom prst="rect">
@@ -5836,8 +6190,8 @@
         </p:nvSpPr>
         <p:spPr>
           <a:xfrm>
-            <a:off x="685800" y="3840480"/>
-            <a:ext cx="10820095" cy="4572000"/>
+            <a:off x="685800" y="1371600"/>
+            <a:ext cx="10515600" cy="4572000"/>
           </a:xfrm>
           <a:prstGeom prst="rect">
             <a:avLst/>
@@ -5851,14 +6205,112 @@
           <a:lstStyle/>
           <a:p>
             <a:pPr>
-              <a:defRPr sz="2800">
-                <a:solidFill>
-                  <a:srgbClr val="4A6FA5"/>
-                </a:solidFill>
-              </a:defRPr>
-            </a:pPr>
-            <a:r>
-              <a:t>Animation  |  Projections  |  Filtering  |  Analysis Charts  |  Catalog Blinking</a:t>
+              <a:lnSpc>
+                <a:spcPct val="150000"/>
+              </a:lnSpc>
+              <a:defRPr sz="2600">
+                <a:solidFill>
+                  <a:srgbClr val="FFFFFF"/>
+                </a:solidFill>
+              </a:defRPr>
+            </a:pPr>
+            <a:r>
+              <a:t>  NEOfixer integration</a:t>
+            </a:r>
+          </a:p>
+          <a:p>
+            <a:pPr>
+              <a:lnSpc>
+                <a:spcPct val="150000"/>
+              </a:lnSpc>
+              <a:defRPr sz="2600">
+                <a:solidFill>
+                  <a:srgbClr val="FFFFFF"/>
+                </a:solidFill>
+              </a:defRPr>
+            </a:pPr>
+            <a:r>
+              <a:t>     - Additional observational planning modes</a:t>
+            </a:r>
+          </a:p>
+          <a:p>
+            <a:pPr>
+              <a:lnSpc>
+                <a:spcPct val="150000"/>
+              </a:lnSpc>
+              <a:defRPr sz="2600">
+                <a:solidFill>
+                  <a:srgbClr val="FFFFFF"/>
+                </a:solidFill>
+              </a:defRPr>
+            </a:pPr>
+            <a:r>
+              <a:t>  Performance optimization for 100,000+ NEOs (catalog growing rapidly)</a:t>
+            </a:r>
+          </a:p>
+          <a:p>
+            <a:pPr>
+              <a:lnSpc>
+                <a:spcPct val="150000"/>
+              </a:lnSpc>
+              <a:defRPr sz="2600">
+                <a:solidFill>
+                  <a:srgbClr val="FFFFFF"/>
+                </a:solidFill>
+              </a:defRPr>
+            </a:pPr>
+            <a:r>
+              <a:t>  Database schema normalization as features expand</a:t>
+            </a:r>
+          </a:p>
+          <a:p>
+            <a:pPr>
+              <a:lnSpc>
+                <a:spcPct val="150000"/>
+              </a:lnSpc>
+              <a:defRPr sz="2600">
+                <a:solidFill>
+                  <a:srgbClr val="FFFFFF"/>
+                </a:solidFill>
+              </a:defRPr>
+            </a:pPr>
+            <a:r>
+              <a:t>  Community feedback and feature requests welcome</a:t>
+            </a:r>
+          </a:p>
+        </p:txBody>
+      </p:sp>
+      <p:sp>
+        <p:nvSpPr>
+          <p:cNvPr id="5" name="TextBox 4"/>
+          <p:cNvSpPr txBox="1"/>
+          <p:nvPr/>
+        </p:nvSpPr>
+        <p:spPr>
+          <a:xfrm>
+            <a:off x="685800" y="4754880"/>
+            <a:ext cx="10515600" cy="548640"/>
+          </a:xfrm>
+          <a:prstGeom prst="rect">
+            <a:avLst/>
+          </a:prstGeom>
+          <a:noFill/>
+        </p:spPr>
+        <p:txBody>
+          <a:bodyPr wrap="none">
+            <a:spAutoFit/>
+          </a:bodyPr>
+          <a:lstStyle/>
+          <a:p>
+            <a:pPr>
+              <a:defRPr sz="2400" b="1">
+                <a:solidFill>
+                  <a:srgbClr val="FFC107"/>
+                </a:solidFill>
+              </a:defRPr>
+            </a:pPr>
+            <a:r>
+              <a:t>Contact: rseaman@arizona.edu</a:t>
             </a:r>
           </a:p>
         </p:txBody>

</xml_diff>

<commit_message>
Add manual animations and tweaks to demo presentation
Co-Authored-By: Claude Opus 4.5 <noreply@anthropic.com>
</commit_message>
<xml_diff>
--- a/presentations/NEOlyzer_Demo.pptx
+++ b/presentations/NEOlyzer_Demo.pptx
@@ -5,18 +5,18 @@
     <p:sldMasterId id="2147483648" r:id="rId1"/>
   </p:sldMasterIdLst>
   <p:sldIdLst>
-    <p:sldId id="256" r:id="rId7"/>
-    <p:sldId id="257" r:id="rId8"/>
-    <p:sldId id="258" r:id="rId9"/>
-    <p:sldId id="259" r:id="rId10"/>
-    <p:sldId id="260" r:id="rId11"/>
-    <p:sldId id="261" r:id="rId12"/>
-    <p:sldId id="262" r:id="rId13"/>
-    <p:sldId id="263" r:id="rId14"/>
-    <p:sldId id="264" r:id="rId15"/>
-    <p:sldId id="265" r:id="rId16"/>
+    <p:sldId id="256" r:id="rId2"/>
+    <p:sldId id="257" r:id="rId3"/>
+    <p:sldId id="258" r:id="rId4"/>
+    <p:sldId id="259" r:id="rId5"/>
+    <p:sldId id="260" r:id="rId6"/>
+    <p:sldId id="261" r:id="rId7"/>
+    <p:sldId id="262" r:id="rId8"/>
+    <p:sldId id="263" r:id="rId9"/>
+    <p:sldId id="264" r:id="rId10"/>
+    <p:sldId id="265" r:id="rId11"/>
   </p:sldIdLst>
-  <p:sldSz cx="12191695" cy="6858000" type="screen4x3"/>
+  <p:sldSz cx="12192000" cy="6858000"/>
   <p:notesSz cx="6858000" cy="9144000"/>
   <p:defaultTextStyle>
     <a:defPPr>
@@ -113,6 +113,22 @@
       </a:defRPr>
     </a:lvl9pPr>
   </p:defaultTextStyle>
+  <p:extLst>
+    <p:ext uri="{EFAFB233-063F-42B5-8137-9DF3F51BA10A}">
+      <p15:sldGuideLst xmlns:p15="http://schemas.microsoft.com/office/powerpoint/2012/main">
+        <p15:guide id="1" orient="horz" pos="2160">
+          <p15:clr>
+            <a:srgbClr val="A4A3A4"/>
+          </p15:clr>
+        </p15:guide>
+        <p15:guide id="2" pos="2880">
+          <p15:clr>
+            <a:srgbClr val="A4A3A4"/>
+          </p15:clr>
+        </p15:guide>
+      </p15:sldGuideLst>
+    </p:ext>
+  </p:extLst>
 </p:presentation>
 </file>
 
@@ -154,10 +170,9 @@
           <a:lstStyle/>
           <a:p>
             <a:r>
-              <a:rPr lang="en-US" smtClean="0"/>
+              <a:rPr lang="en-US"/>
               <a:t>Click to edit Master title style</a:t>
             </a:r>
-            <a:endParaRPr lang="en-US"/>
           </a:p>
         </p:txBody>
       </p:sp>
@@ -273,10 +288,9 @@
           </a:lstStyle>
           <a:p>
             <a:r>
-              <a:rPr lang="en-US" smtClean="0"/>
+              <a:rPr lang="en-US"/>
               <a:t>Click to edit Master subtitle style</a:t>
             </a:r>
-            <a:endParaRPr lang="en-US"/>
           </a:p>
         </p:txBody>
       </p:sp>
@@ -297,7 +311,7 @@
           <a:p>
             <a:fld id="{5BCAD085-E8A6-8845-BD4E-CB4CCA059FC4}" type="datetimeFigureOut">
               <a:rPr lang="en-US" smtClean="0"/>
-              <a:t>1/27/13</a:t>
+              <a:t>2/1/26</a:t>
             </a:fld>
             <a:endParaRPr lang="en-US"/>
           </a:p>
@@ -391,10 +405,9 @@
           <a:lstStyle/>
           <a:p>
             <a:r>
-              <a:rPr lang="en-US" smtClean="0"/>
+              <a:rPr lang="en-US"/>
               <a:t>Click to edit Master title style</a:t>
             </a:r>
-            <a:endParaRPr lang="en-US"/>
           </a:p>
         </p:txBody>
       </p:sp>
@@ -415,38 +428,37 @@
           <a:p>
             <a:pPr lvl="0"/>
             <a:r>
-              <a:rPr lang="en-US" smtClean="0"/>
+              <a:rPr lang="en-US"/>
               <a:t>Click to edit Master text styles</a:t>
             </a:r>
           </a:p>
           <a:p>
             <a:pPr lvl="1"/>
             <a:r>
-              <a:rPr lang="en-US" smtClean="0"/>
+              <a:rPr lang="en-US"/>
               <a:t>Second level</a:t>
             </a:r>
           </a:p>
           <a:p>
             <a:pPr lvl="2"/>
             <a:r>
-              <a:rPr lang="en-US" smtClean="0"/>
+              <a:rPr lang="en-US"/>
               <a:t>Third level</a:t>
             </a:r>
           </a:p>
           <a:p>
             <a:pPr lvl="3"/>
             <a:r>
-              <a:rPr lang="en-US" smtClean="0"/>
+              <a:rPr lang="en-US"/>
               <a:t>Fourth level</a:t>
             </a:r>
           </a:p>
           <a:p>
             <a:pPr lvl="4"/>
             <a:r>
-              <a:rPr lang="en-US" smtClean="0"/>
+              <a:rPr lang="en-US"/>
               <a:t>Fifth level</a:t>
             </a:r>
-            <a:endParaRPr lang="en-US"/>
           </a:p>
         </p:txBody>
       </p:sp>
@@ -467,7 +479,7 @@
           <a:p>
             <a:fld id="{5BCAD085-E8A6-8845-BD4E-CB4CCA059FC4}" type="datetimeFigureOut">
               <a:rPr lang="en-US" smtClean="0"/>
-              <a:t>1/27/13</a:t>
+              <a:t>2/1/26</a:t>
             </a:fld>
             <a:endParaRPr lang="en-US"/>
           </a:p>
@@ -566,10 +578,9 @@
           <a:lstStyle/>
           <a:p>
             <a:r>
-              <a:rPr lang="en-US" smtClean="0"/>
+              <a:rPr lang="en-US"/>
               <a:t>Click to edit Master title style</a:t>
             </a:r>
-            <a:endParaRPr lang="en-US"/>
           </a:p>
         </p:txBody>
       </p:sp>
@@ -595,38 +606,37 @@
           <a:p>
             <a:pPr lvl="0"/>
             <a:r>
-              <a:rPr lang="en-US" smtClean="0"/>
+              <a:rPr lang="en-US"/>
               <a:t>Click to edit Master text styles</a:t>
             </a:r>
           </a:p>
           <a:p>
             <a:pPr lvl="1"/>
             <a:r>
-              <a:rPr lang="en-US" smtClean="0"/>
+              <a:rPr lang="en-US"/>
               <a:t>Second level</a:t>
             </a:r>
           </a:p>
           <a:p>
             <a:pPr lvl="2"/>
             <a:r>
-              <a:rPr lang="en-US" smtClean="0"/>
+              <a:rPr lang="en-US"/>
               <a:t>Third level</a:t>
             </a:r>
           </a:p>
           <a:p>
             <a:pPr lvl="3"/>
             <a:r>
-              <a:rPr lang="en-US" smtClean="0"/>
+              <a:rPr lang="en-US"/>
               <a:t>Fourth level</a:t>
             </a:r>
           </a:p>
           <a:p>
             <a:pPr lvl="4"/>
             <a:r>
-              <a:rPr lang="en-US" smtClean="0"/>
+              <a:rPr lang="en-US"/>
               <a:t>Fifth level</a:t>
             </a:r>
-            <a:endParaRPr lang="en-US"/>
           </a:p>
         </p:txBody>
       </p:sp>
@@ -647,7 +657,7 @@
           <a:p>
             <a:fld id="{5BCAD085-E8A6-8845-BD4E-CB4CCA059FC4}" type="datetimeFigureOut">
               <a:rPr lang="en-US" smtClean="0"/>
-              <a:t>1/27/13</a:t>
+              <a:t>2/1/26</a:t>
             </a:fld>
             <a:endParaRPr lang="en-US"/>
           </a:p>
@@ -741,10 +751,9 @@
           <a:lstStyle/>
           <a:p>
             <a:r>
-              <a:rPr lang="en-US" smtClean="0"/>
+              <a:rPr lang="en-US"/>
               <a:t>Click to edit Master title style</a:t>
             </a:r>
-            <a:endParaRPr lang="en-US"/>
           </a:p>
         </p:txBody>
       </p:sp>
@@ -765,38 +774,37 @@
           <a:p>
             <a:pPr lvl="0"/>
             <a:r>
-              <a:rPr lang="en-US" smtClean="0"/>
+              <a:rPr lang="en-US"/>
               <a:t>Click to edit Master text styles</a:t>
             </a:r>
           </a:p>
           <a:p>
             <a:pPr lvl="1"/>
             <a:r>
-              <a:rPr lang="en-US" smtClean="0"/>
+              <a:rPr lang="en-US"/>
               <a:t>Second level</a:t>
             </a:r>
           </a:p>
           <a:p>
             <a:pPr lvl="2"/>
             <a:r>
-              <a:rPr lang="en-US" smtClean="0"/>
+              <a:rPr lang="en-US"/>
               <a:t>Third level</a:t>
             </a:r>
           </a:p>
           <a:p>
             <a:pPr lvl="3"/>
             <a:r>
-              <a:rPr lang="en-US" smtClean="0"/>
+              <a:rPr lang="en-US"/>
               <a:t>Fourth level</a:t>
             </a:r>
           </a:p>
           <a:p>
             <a:pPr lvl="4"/>
             <a:r>
-              <a:rPr lang="en-US" smtClean="0"/>
+              <a:rPr lang="en-US"/>
               <a:t>Fifth level</a:t>
             </a:r>
-            <a:endParaRPr lang="en-US"/>
           </a:p>
         </p:txBody>
       </p:sp>
@@ -817,7 +825,7 @@
           <a:p>
             <a:fld id="{5BCAD085-E8A6-8845-BD4E-CB4CCA059FC4}" type="datetimeFigureOut">
               <a:rPr lang="en-US" smtClean="0"/>
-              <a:t>1/27/13</a:t>
+              <a:t>2/1/26</a:t>
             </a:fld>
             <a:endParaRPr lang="en-US"/>
           </a:p>
@@ -920,10 +928,9 @@
           </a:lstStyle>
           <a:p>
             <a:r>
-              <a:rPr lang="en-US" smtClean="0"/>
+              <a:rPr lang="en-US"/>
               <a:t>Click to edit Master title style</a:t>
             </a:r>
-            <a:endParaRPr lang="en-US"/>
           </a:p>
         </p:txBody>
       </p:sp>
@@ -1040,7 +1047,7 @@
           <a:p>
             <a:pPr lvl="0"/>
             <a:r>
-              <a:rPr lang="en-US" smtClean="0"/>
+              <a:rPr lang="en-US"/>
               <a:t>Click to edit Master text styles</a:t>
             </a:r>
           </a:p>
@@ -1063,7 +1070,7 @@
           <a:p>
             <a:fld id="{5BCAD085-E8A6-8845-BD4E-CB4CCA059FC4}" type="datetimeFigureOut">
               <a:rPr lang="en-US" smtClean="0"/>
-              <a:t>1/27/13</a:t>
+              <a:t>2/1/26</a:t>
             </a:fld>
             <a:endParaRPr lang="en-US"/>
           </a:p>
@@ -1157,10 +1164,9 @@
           <a:lstStyle/>
           <a:p>
             <a:r>
-              <a:rPr lang="en-US" smtClean="0"/>
+              <a:rPr lang="en-US"/>
               <a:t>Click to edit Master title style</a:t>
             </a:r>
-            <a:endParaRPr lang="en-US"/>
           </a:p>
         </p:txBody>
       </p:sp>
@@ -1214,38 +1220,37 @@
           <a:p>
             <a:pPr lvl="0"/>
             <a:r>
-              <a:rPr lang="en-US" smtClean="0"/>
+              <a:rPr lang="en-US"/>
               <a:t>Click to edit Master text styles</a:t>
             </a:r>
           </a:p>
           <a:p>
             <a:pPr lvl="1"/>
             <a:r>
-              <a:rPr lang="en-US" smtClean="0"/>
+              <a:rPr lang="en-US"/>
               <a:t>Second level</a:t>
             </a:r>
           </a:p>
           <a:p>
             <a:pPr lvl="2"/>
             <a:r>
-              <a:rPr lang="en-US" smtClean="0"/>
+              <a:rPr lang="en-US"/>
               <a:t>Third level</a:t>
             </a:r>
           </a:p>
           <a:p>
             <a:pPr lvl="3"/>
             <a:r>
-              <a:rPr lang="en-US" smtClean="0"/>
+              <a:rPr lang="en-US"/>
               <a:t>Fourth level</a:t>
             </a:r>
           </a:p>
           <a:p>
             <a:pPr lvl="4"/>
             <a:r>
-              <a:rPr lang="en-US" smtClean="0"/>
+              <a:rPr lang="en-US"/>
               <a:t>Fifth level</a:t>
             </a:r>
-            <a:endParaRPr lang="en-US"/>
           </a:p>
         </p:txBody>
       </p:sp>
@@ -1299,38 +1304,37 @@
           <a:p>
             <a:pPr lvl="0"/>
             <a:r>
-              <a:rPr lang="en-US" smtClean="0"/>
+              <a:rPr lang="en-US"/>
               <a:t>Click to edit Master text styles</a:t>
             </a:r>
           </a:p>
           <a:p>
             <a:pPr lvl="1"/>
             <a:r>
-              <a:rPr lang="en-US" smtClean="0"/>
+              <a:rPr lang="en-US"/>
               <a:t>Second level</a:t>
             </a:r>
           </a:p>
           <a:p>
             <a:pPr lvl="2"/>
             <a:r>
-              <a:rPr lang="en-US" smtClean="0"/>
+              <a:rPr lang="en-US"/>
               <a:t>Third level</a:t>
             </a:r>
           </a:p>
           <a:p>
             <a:pPr lvl="3"/>
             <a:r>
-              <a:rPr lang="en-US" smtClean="0"/>
+              <a:rPr lang="en-US"/>
               <a:t>Fourth level</a:t>
             </a:r>
           </a:p>
           <a:p>
             <a:pPr lvl="4"/>
             <a:r>
-              <a:rPr lang="en-US" smtClean="0"/>
+              <a:rPr lang="en-US"/>
               <a:t>Fifth level</a:t>
             </a:r>
-            <a:endParaRPr lang="en-US"/>
           </a:p>
         </p:txBody>
       </p:sp>
@@ -1351,7 +1355,7 @@
           <a:p>
             <a:fld id="{5BCAD085-E8A6-8845-BD4E-CB4CCA059FC4}" type="datetimeFigureOut">
               <a:rPr lang="en-US" smtClean="0"/>
-              <a:t>1/27/13</a:t>
+              <a:t>2/1/26</a:t>
             </a:fld>
             <a:endParaRPr lang="en-US"/>
           </a:p>
@@ -1449,10 +1453,9 @@
           </a:lstStyle>
           <a:p>
             <a:r>
-              <a:rPr lang="en-US" smtClean="0"/>
+              <a:rPr lang="en-US"/>
               <a:t>Click to edit Master title style</a:t>
             </a:r>
-            <a:endParaRPr lang="en-US"/>
           </a:p>
         </p:txBody>
       </p:sp>
@@ -1515,7 +1518,7 @@
           <a:p>
             <a:pPr lvl="0"/>
             <a:r>
-              <a:rPr lang="en-US" smtClean="0"/>
+              <a:rPr lang="en-US"/>
               <a:t>Click to edit Master text styles</a:t>
             </a:r>
           </a:p>
@@ -1571,38 +1574,37 @@
           <a:p>
             <a:pPr lvl="0"/>
             <a:r>
-              <a:rPr lang="en-US" smtClean="0"/>
+              <a:rPr lang="en-US"/>
               <a:t>Click to edit Master text styles</a:t>
             </a:r>
           </a:p>
           <a:p>
             <a:pPr lvl="1"/>
             <a:r>
-              <a:rPr lang="en-US" smtClean="0"/>
+              <a:rPr lang="en-US"/>
               <a:t>Second level</a:t>
             </a:r>
           </a:p>
           <a:p>
             <a:pPr lvl="2"/>
             <a:r>
-              <a:rPr lang="en-US" smtClean="0"/>
+              <a:rPr lang="en-US"/>
               <a:t>Third level</a:t>
             </a:r>
           </a:p>
           <a:p>
             <a:pPr lvl="3"/>
             <a:r>
-              <a:rPr lang="en-US" smtClean="0"/>
+              <a:rPr lang="en-US"/>
               <a:t>Fourth level</a:t>
             </a:r>
           </a:p>
           <a:p>
             <a:pPr lvl="4"/>
             <a:r>
-              <a:rPr lang="en-US" smtClean="0"/>
+              <a:rPr lang="en-US"/>
               <a:t>Fifth level</a:t>
             </a:r>
-            <a:endParaRPr lang="en-US"/>
           </a:p>
         </p:txBody>
       </p:sp>
@@ -1665,7 +1667,7 @@
           <a:p>
             <a:pPr lvl="0"/>
             <a:r>
-              <a:rPr lang="en-US" smtClean="0"/>
+              <a:rPr lang="en-US"/>
               <a:t>Click to edit Master text styles</a:t>
             </a:r>
           </a:p>
@@ -1721,38 +1723,37 @@
           <a:p>
             <a:pPr lvl="0"/>
             <a:r>
-              <a:rPr lang="en-US" smtClean="0"/>
+              <a:rPr lang="en-US"/>
               <a:t>Click to edit Master text styles</a:t>
             </a:r>
           </a:p>
           <a:p>
             <a:pPr lvl="1"/>
             <a:r>
-              <a:rPr lang="en-US" smtClean="0"/>
+              <a:rPr lang="en-US"/>
               <a:t>Second level</a:t>
             </a:r>
           </a:p>
           <a:p>
             <a:pPr lvl="2"/>
             <a:r>
-              <a:rPr lang="en-US" smtClean="0"/>
+              <a:rPr lang="en-US"/>
               <a:t>Third level</a:t>
             </a:r>
           </a:p>
           <a:p>
             <a:pPr lvl="3"/>
             <a:r>
-              <a:rPr lang="en-US" smtClean="0"/>
+              <a:rPr lang="en-US"/>
               <a:t>Fourth level</a:t>
             </a:r>
           </a:p>
           <a:p>
             <a:pPr lvl="4"/>
             <a:r>
-              <a:rPr lang="en-US" smtClean="0"/>
+              <a:rPr lang="en-US"/>
               <a:t>Fifth level</a:t>
             </a:r>
-            <a:endParaRPr lang="en-US"/>
           </a:p>
         </p:txBody>
       </p:sp>
@@ -1773,7 +1774,7 @@
           <a:p>
             <a:fld id="{5BCAD085-E8A6-8845-BD4E-CB4CCA059FC4}" type="datetimeFigureOut">
               <a:rPr lang="en-US" smtClean="0"/>
-              <a:t>1/27/13</a:t>
+              <a:t>2/1/26</a:t>
             </a:fld>
             <a:endParaRPr lang="en-US"/>
           </a:p>
@@ -1867,10 +1868,9 @@
           <a:lstStyle/>
           <a:p>
             <a:r>
-              <a:rPr lang="en-US" smtClean="0"/>
+              <a:rPr lang="en-US"/>
               <a:t>Click to edit Master title style</a:t>
             </a:r>
-            <a:endParaRPr lang="en-US"/>
           </a:p>
         </p:txBody>
       </p:sp>
@@ -1891,7 +1891,7 @@
           <a:p>
             <a:fld id="{5BCAD085-E8A6-8845-BD4E-CB4CCA059FC4}" type="datetimeFigureOut">
               <a:rPr lang="en-US" smtClean="0"/>
-              <a:t>1/27/13</a:t>
+              <a:t>2/1/26</a:t>
             </a:fld>
             <a:endParaRPr lang="en-US"/>
           </a:p>
@@ -1986,7 +1986,7 @@
           <a:p>
             <a:fld id="{5BCAD085-E8A6-8845-BD4E-CB4CCA059FC4}" type="datetimeFigureOut">
               <a:rPr lang="en-US" smtClean="0"/>
-              <a:t>1/27/13</a:t>
+              <a:t>2/1/26</a:t>
             </a:fld>
             <a:endParaRPr lang="en-US"/>
           </a:p>
@@ -2089,10 +2089,9 @@
           </a:lstStyle>
           <a:p>
             <a:r>
-              <a:rPr lang="en-US" smtClean="0"/>
+              <a:rPr lang="en-US"/>
               <a:t>Click to edit Master title style</a:t>
             </a:r>
-            <a:endParaRPr lang="en-US"/>
           </a:p>
         </p:txBody>
       </p:sp>
@@ -2146,38 +2145,37 @@
           <a:p>
             <a:pPr lvl="0"/>
             <a:r>
-              <a:rPr lang="en-US" smtClean="0"/>
+              <a:rPr lang="en-US"/>
               <a:t>Click to edit Master text styles</a:t>
             </a:r>
           </a:p>
           <a:p>
             <a:pPr lvl="1"/>
             <a:r>
-              <a:rPr lang="en-US" smtClean="0"/>
+              <a:rPr lang="en-US"/>
               <a:t>Second level</a:t>
             </a:r>
           </a:p>
           <a:p>
             <a:pPr lvl="2"/>
             <a:r>
-              <a:rPr lang="en-US" smtClean="0"/>
+              <a:rPr lang="en-US"/>
               <a:t>Third level</a:t>
             </a:r>
           </a:p>
           <a:p>
             <a:pPr lvl="3"/>
             <a:r>
-              <a:rPr lang="en-US" smtClean="0"/>
+              <a:rPr lang="en-US"/>
               <a:t>Fourth level</a:t>
             </a:r>
           </a:p>
           <a:p>
             <a:pPr lvl="4"/>
             <a:r>
-              <a:rPr lang="en-US" smtClean="0"/>
+              <a:rPr lang="en-US"/>
               <a:t>Fifth level</a:t>
             </a:r>
-            <a:endParaRPr lang="en-US"/>
           </a:p>
         </p:txBody>
       </p:sp>
@@ -2240,7 +2238,7 @@
           <a:p>
             <a:pPr lvl="0"/>
             <a:r>
-              <a:rPr lang="en-US" smtClean="0"/>
+              <a:rPr lang="en-US"/>
               <a:t>Click to edit Master text styles</a:t>
             </a:r>
           </a:p>
@@ -2263,7 +2261,7 @@
           <a:p>
             <a:fld id="{5BCAD085-E8A6-8845-BD4E-CB4CCA059FC4}" type="datetimeFigureOut">
               <a:rPr lang="en-US" smtClean="0"/>
-              <a:t>1/27/13</a:t>
+              <a:t>2/1/26</a:t>
             </a:fld>
             <a:endParaRPr lang="en-US"/>
           </a:p>
@@ -2366,10 +2364,9 @@
           </a:lstStyle>
           <a:p>
             <a:r>
-              <a:rPr lang="en-US" smtClean="0"/>
+              <a:rPr lang="en-US"/>
               <a:t>Click to edit Master title style</a:t>
             </a:r>
-            <a:endParaRPr lang="en-US"/>
           </a:p>
         </p:txBody>
       </p:sp>
@@ -2493,7 +2490,7 @@
           <a:p>
             <a:pPr lvl="0"/>
             <a:r>
-              <a:rPr lang="en-US" smtClean="0"/>
+              <a:rPr lang="en-US"/>
               <a:t>Click to edit Master text styles</a:t>
             </a:r>
           </a:p>
@@ -2516,7 +2513,7 @@
           <a:p>
             <a:fld id="{5BCAD085-E8A6-8845-BD4E-CB4CCA059FC4}" type="datetimeFigureOut">
               <a:rPr lang="en-US" smtClean="0"/>
-              <a:t>1/27/13</a:t>
+              <a:t>2/1/26</a:t>
             </a:fld>
             <a:endParaRPr lang="en-US"/>
           </a:p>
@@ -2625,10 +2622,9 @@
           <a:lstStyle/>
           <a:p>
             <a:r>
-              <a:rPr lang="en-US" smtClean="0"/>
+              <a:rPr lang="en-US"/>
               <a:t>Click to edit Master title style</a:t>
             </a:r>
-            <a:endParaRPr lang="en-US"/>
           </a:p>
         </p:txBody>
       </p:sp>
@@ -2659,38 +2655,37 @@
           <a:p>
             <a:pPr lvl="0"/>
             <a:r>
-              <a:rPr lang="en-US" smtClean="0"/>
+              <a:rPr lang="en-US"/>
               <a:t>Click to edit Master text styles</a:t>
             </a:r>
           </a:p>
           <a:p>
             <a:pPr lvl="1"/>
             <a:r>
-              <a:rPr lang="en-US" smtClean="0"/>
+              <a:rPr lang="en-US"/>
               <a:t>Second level</a:t>
             </a:r>
           </a:p>
           <a:p>
             <a:pPr lvl="2"/>
             <a:r>
-              <a:rPr lang="en-US" smtClean="0"/>
+              <a:rPr lang="en-US"/>
               <a:t>Third level</a:t>
             </a:r>
           </a:p>
           <a:p>
             <a:pPr lvl="3"/>
             <a:r>
-              <a:rPr lang="en-US" smtClean="0"/>
+              <a:rPr lang="en-US"/>
               <a:t>Fourth level</a:t>
             </a:r>
           </a:p>
           <a:p>
             <a:pPr lvl="4"/>
             <a:r>
-              <a:rPr lang="en-US" smtClean="0"/>
+              <a:rPr lang="en-US"/>
               <a:t>Fifth level</a:t>
             </a:r>
-            <a:endParaRPr lang="en-US"/>
           </a:p>
         </p:txBody>
       </p:sp>
@@ -2729,7 +2724,7 @@
           <a:p>
             <a:fld id="{5BCAD085-E8A6-8845-BD4E-CB4CCA059FC4}" type="datetimeFigureOut">
               <a:rPr lang="en-US" smtClean="0"/>
-              <a:t>1/27/13</a:t>
+              <a:t>2/1/26</a:t>
             </a:fld>
             <a:endParaRPr lang="en-US"/>
           </a:p>
@@ -3088,7 +3083,7 @@
 </file>
 
 <file path=ppt/slides/slide1.xml><?xml version="1.0" encoding="utf-8"?>
-<p:sld xmlns:a="http://schemas.openxmlformats.org/drawingml/2006/main" xmlns:p="http://schemas.openxmlformats.org/presentationml/2006/main" xmlns:r="http://schemas.openxmlformats.org/officeDocument/2006/relationships">
+<p:sld xmlns:a="http://schemas.openxmlformats.org/drawingml/2006/main" xmlns:r="http://schemas.openxmlformats.org/officeDocument/2006/relationships" xmlns:p="http://schemas.openxmlformats.org/presentationml/2006/main">
   <p:cSld>
     <p:bg>
       <p:bgPr>
@@ -3104,7 +3099,14 @@
         <p:cNvGrpSpPr/>
         <p:nvPr/>
       </p:nvGrpSpPr>
-      <p:grpSpPr/>
+      <p:grpSpPr>
+        <a:xfrm>
+          <a:off x="0" y="0"/>
+          <a:ext cx="0" cy="0"/>
+          <a:chOff x="0" y="0"/>
+          <a:chExt cx="0" cy="0"/>
+        </a:xfrm>
+      </p:grpSpPr>
       <p:sp>
         <p:nvSpPr>
           <p:cNvPr id="2" name="TextBox 1"/>
@@ -3215,6 +3217,7 @@
           <a:lstStyle/>
           <a:p>
             <a:pPr algn="ctr"/>
+            <a:endParaRPr/>
           </a:p>
         </p:txBody>
       </p:sp>
@@ -3398,6 +3401,7 @@
           <a:lstStyle/>
           <a:p>
             <a:pPr algn="ctr"/>
+            <a:endParaRPr/>
           </a:p>
         </p:txBody>
       </p:sp>
@@ -3434,7 +3438,7 @@
 </file>
 
 <file path=ppt/slides/slide10.xml><?xml version="1.0" encoding="utf-8"?>
-<p:sld xmlns:a="http://schemas.openxmlformats.org/drawingml/2006/main" xmlns:p="http://schemas.openxmlformats.org/presentationml/2006/main" xmlns:r="http://schemas.openxmlformats.org/officeDocument/2006/relationships">
+<p:sld xmlns:a="http://schemas.openxmlformats.org/drawingml/2006/main" xmlns:r="http://schemas.openxmlformats.org/officeDocument/2006/relationships" xmlns:p="http://schemas.openxmlformats.org/presentationml/2006/main">
   <p:cSld>
     <p:bg>
       <p:bgPr>
@@ -3450,7 +3454,14 @@
         <p:cNvGrpSpPr/>
         <p:nvPr/>
       </p:nvGrpSpPr>
-      <p:grpSpPr/>
+      <p:grpSpPr>
+        <a:xfrm>
+          <a:off x="0" y="0"/>
+          <a:ext cx="0" cy="0"/>
+          <a:chOff x="0" y="0"/>
+          <a:chExt cx="0" cy="0"/>
+        </a:xfrm>
+      </p:grpSpPr>
       <p:sp>
         <p:nvSpPr>
           <p:cNvPr id="2" name="TextBox 1"/>
@@ -3459,7 +3470,7 @@
         </p:nvSpPr>
         <p:spPr>
           <a:xfrm>
-            <a:off x="457200" y="2286000"/>
+            <a:off x="457352" y="1471808"/>
             <a:ext cx="11277295" cy="1097280"/>
           </a:xfrm>
           <a:prstGeom prst="rect">
@@ -3481,6 +3492,7 @@
               </a:defRPr>
             </a:pPr>
             <a:r>
+              <a:rPr dirty="0"/>
               <a:t>Live Demo</a:t>
             </a:r>
           </a:p>
@@ -3494,7 +3506,7 @@
         </p:nvSpPr>
         <p:spPr>
           <a:xfrm>
-            <a:off x="3657600" y="3108960"/>
+            <a:off x="3657752" y="2294768"/>
             <a:ext cx="4876495" cy="50800"/>
           </a:xfrm>
           <a:prstGeom prst="rect">
@@ -3526,6 +3538,7 @@
           <a:lstStyle/>
           <a:p>
             <a:pPr algn="ctr"/>
+            <a:endParaRPr/>
           </a:p>
         </p:txBody>
       </p:sp>
@@ -3537,7 +3550,7 @@
         </p:nvSpPr>
         <p:spPr>
           <a:xfrm>
-            <a:off x="685800" y="3840480"/>
+            <a:off x="685952" y="3026288"/>
             <a:ext cx="10820095" cy="4572000"/>
           </a:xfrm>
           <a:prstGeom prst="rect">
@@ -3572,7 +3585,7 @@
         </p:nvSpPr>
         <p:spPr>
           <a:xfrm>
-            <a:off x="9416491" y="4082796"/>
+            <a:off x="5149596" y="4208056"/>
             <a:ext cx="1892807" cy="1892807"/>
           </a:xfrm>
           <a:prstGeom prst="ellipse">
@@ -3604,6 +3617,7 @@
           <a:lstStyle/>
           <a:p>
             <a:pPr algn="ctr"/>
+            <a:endParaRPr/>
           </a:p>
         </p:txBody>
       </p:sp>
@@ -3623,7 +3637,7 @@
         </p:blipFill>
         <p:spPr>
           <a:xfrm>
-            <a:off x="9539935" y="4206240"/>
+            <a:off x="5273040" y="4331500"/>
             <a:ext cx="1645920" cy="1645920"/>
           </a:xfrm>
           <a:prstGeom prst="rect">
@@ -3640,7 +3654,7 @@
 </file>
 
 <file path=ppt/slides/slide2.xml><?xml version="1.0" encoding="utf-8"?>
-<p:sld xmlns:a="http://schemas.openxmlformats.org/drawingml/2006/main" xmlns:p="http://schemas.openxmlformats.org/presentationml/2006/main" xmlns:r="http://schemas.openxmlformats.org/officeDocument/2006/relationships">
+<p:sld xmlns:a="http://schemas.openxmlformats.org/drawingml/2006/main" xmlns:r="http://schemas.openxmlformats.org/officeDocument/2006/relationships" xmlns:p="http://schemas.openxmlformats.org/presentationml/2006/main">
   <p:cSld>
     <p:bg>
       <p:bgPr>
@@ -3656,7 +3670,14 @@
         <p:cNvGrpSpPr/>
         <p:nvPr/>
       </p:nvGrpSpPr>
-      <p:grpSpPr/>
+      <p:grpSpPr>
+        <a:xfrm>
+          <a:off x="0" y="0"/>
+          <a:ext cx="0" cy="0"/>
+          <a:chOff x="0" y="0"/>
+          <a:chExt cx="0" cy="0"/>
+        </a:xfrm>
+      </p:grpSpPr>
       <p:sp>
         <p:nvSpPr>
           <p:cNvPr id="2" name="TextBox 1"/>
@@ -3732,6 +3753,7 @@
           <a:lstStyle/>
           <a:p>
             <a:pPr algn="ctr"/>
+            <a:endParaRPr/>
           </a:p>
         </p:txBody>
       </p:sp>
@@ -3835,7 +3857,7 @@
 </file>
 
 <file path=ppt/slides/slide3.xml><?xml version="1.0" encoding="utf-8"?>
-<p:sld xmlns:a="http://schemas.openxmlformats.org/drawingml/2006/main" xmlns:p="http://schemas.openxmlformats.org/presentationml/2006/main" xmlns:r="http://schemas.openxmlformats.org/officeDocument/2006/relationships">
+<p:sld xmlns:a="http://schemas.openxmlformats.org/drawingml/2006/main" xmlns:r="http://schemas.openxmlformats.org/officeDocument/2006/relationships" xmlns:p="http://schemas.openxmlformats.org/presentationml/2006/main">
   <p:cSld>
     <p:bg>
       <p:bgPr>
@@ -3851,7 +3873,14 @@
         <p:cNvGrpSpPr/>
         <p:nvPr/>
       </p:nvGrpSpPr>
-      <p:grpSpPr/>
+      <p:grpSpPr>
+        <a:xfrm>
+          <a:off x="0" y="0"/>
+          <a:ext cx="0" cy="0"/>
+          <a:chOff x="0" y="0"/>
+          <a:chExt cx="0" cy="0"/>
+        </a:xfrm>
+      </p:grpSpPr>
       <p:sp>
         <p:nvSpPr>
           <p:cNvPr id="2" name="TextBox 1"/>
@@ -3927,6 +3956,7 @@
           <a:lstStyle/>
           <a:p>
             <a:pPr algn="ctr"/>
+            <a:endParaRPr/>
           </a:p>
         </p:txBody>
       </p:sp>
@@ -4071,8 +4101,8 @@
         </p:nvSpPr>
         <p:spPr>
           <a:xfrm>
-            <a:off x="2898648" y="5029200"/>
-            <a:ext cx="6400800" cy="914400"/>
+            <a:off x="3345013" y="5361140"/>
+            <a:ext cx="5197174" cy="688932"/>
           </a:xfrm>
           <a:prstGeom prst="roundRect">
             <a:avLst/>
@@ -4101,7 +4131,7 @@
           </a:fontRef>
         </p:style>
         <p:txBody>
-          <a:bodyPr rtlCol="0" anchor="ctr" wrap="square"/>
+          <a:bodyPr wrap="square" rtlCol="0" anchor="ctr"/>
           <a:lstStyle/>
           <a:p>
             <a:pPr algn="ctr">
@@ -4122,11 +4152,89 @@
   <p:clrMapOvr>
     <a:masterClrMapping/>
   </p:clrMapOvr>
+  <p:timing>
+    <p:tnLst>
+      <p:par>
+        <p:cTn id="1" dur="indefinite" restart="never" nodeType="tmRoot">
+          <p:childTnLst>
+            <p:seq concurrent="1" nextAc="seek">
+              <p:cTn id="2" dur="indefinite" nodeType="mainSeq">
+                <p:childTnLst>
+                  <p:par>
+                    <p:cTn id="3" fill="hold">
+                      <p:stCondLst>
+                        <p:cond delay="indefinite"/>
+                      </p:stCondLst>
+                      <p:childTnLst>
+                        <p:par>
+                          <p:cTn id="4" fill="hold">
+                            <p:stCondLst>
+                              <p:cond delay="0"/>
+                            </p:stCondLst>
+                            <p:childTnLst>
+                              <p:par>
+                                <p:cTn id="5" presetID="1" presetClass="entr" presetSubtype="0" fill="hold" grpId="0" nodeType="clickEffect">
+                                  <p:stCondLst>
+                                    <p:cond delay="0"/>
+                                  </p:stCondLst>
+                                  <p:childTnLst>
+                                    <p:set>
+                                      <p:cBhvr>
+                                        <p:cTn id="6" dur="1" fill="hold">
+                                          <p:stCondLst>
+                                            <p:cond delay="0"/>
+                                          </p:stCondLst>
+                                        </p:cTn>
+                                        <p:tgtEl>
+                                          <p:spTgt spid="6"/>
+                                        </p:tgtEl>
+                                        <p:attrNameLst>
+                                          <p:attrName>style.visibility</p:attrName>
+                                        </p:attrNameLst>
+                                      </p:cBhvr>
+                                      <p:to>
+                                        <p:strVal val="visible"/>
+                                      </p:to>
+                                    </p:set>
+                                  </p:childTnLst>
+                                </p:cTn>
+                              </p:par>
+                            </p:childTnLst>
+                          </p:cTn>
+                        </p:par>
+                      </p:childTnLst>
+                    </p:cTn>
+                  </p:par>
+                </p:childTnLst>
+              </p:cTn>
+              <p:prevCondLst>
+                <p:cond evt="onPrev" delay="0">
+                  <p:tgtEl>
+                    <p:sldTgt/>
+                  </p:tgtEl>
+                </p:cond>
+              </p:prevCondLst>
+              <p:nextCondLst>
+                <p:cond evt="onNext" delay="0">
+                  <p:tgtEl>
+                    <p:sldTgt/>
+                  </p:tgtEl>
+                </p:cond>
+              </p:nextCondLst>
+            </p:seq>
+          </p:childTnLst>
+        </p:cTn>
+      </p:par>
+    </p:tnLst>
+    <p:bldLst>
+      <p:bldP spid="6" grpId="0" animBg="1"/>
+    </p:bldLst>
+  </p:timing>
 </p:sld>
 </file>
 
 <file path=ppt/slides/slide4.xml><?xml version="1.0" encoding="utf-8"?>
-<p:sld xmlns:a="http://schemas.openxmlformats.org/drawingml/2006/main" xmlns:p="http://schemas.openxmlformats.org/presentationml/2006/main" xmlns:r="http://schemas.openxmlformats.org/officeDocument/2006/relationships">
+<p:sld xmlns:a="http://schemas.openxmlformats.org/drawingml/2006/main" xmlns:r="http://schemas.openxmlformats.org/officeDocument/2006/relationships" xmlns:p="http://schemas.openxmlformats.org/presentationml/2006/main">
   <p:cSld>
     <p:bg>
       <p:bgPr>
@@ -4142,7 +4250,14 @@
         <p:cNvGrpSpPr/>
         <p:nvPr/>
       </p:nvGrpSpPr>
-      <p:grpSpPr/>
+      <p:grpSpPr>
+        <a:xfrm>
+          <a:off x="0" y="0"/>
+          <a:ext cx="0" cy="0"/>
+          <a:chOff x="0" y="0"/>
+          <a:chExt cx="0" cy="0"/>
+        </a:xfrm>
+      </p:grpSpPr>
       <p:sp>
         <p:nvSpPr>
           <p:cNvPr id="2" name="TextBox 1"/>
@@ -4218,6 +4333,7 @@
           <a:lstStyle/>
           <a:p>
             <a:pPr algn="ctr"/>
+            <a:endParaRPr/>
           </a:p>
         </p:txBody>
       </p:sp>
@@ -4570,8 +4686,8 @@
         </p:nvSpPr>
         <p:spPr>
           <a:xfrm>
-            <a:off x="5943600" y="5760720"/>
-            <a:ext cx="5486400" cy="731520"/>
+            <a:off x="6238700" y="5303520"/>
+            <a:ext cx="4590789" cy="731520"/>
           </a:xfrm>
           <a:prstGeom prst="roundRect">
             <a:avLst/>
@@ -4600,7 +4716,7 @@
           </a:fontRef>
         </p:style>
         <p:txBody>
-          <a:bodyPr rtlCol="0" anchor="ctr" wrap="square"/>
+          <a:bodyPr wrap="square" rtlCol="0" anchor="ctr"/>
           <a:lstStyle/>
           <a:p>
             <a:pPr algn="ctr">
@@ -4621,11 +4737,89 @@
   <p:clrMapOvr>
     <a:masterClrMapping/>
   </p:clrMapOvr>
+  <p:timing>
+    <p:tnLst>
+      <p:par>
+        <p:cTn id="1" dur="indefinite" restart="never" nodeType="tmRoot">
+          <p:childTnLst>
+            <p:seq concurrent="1" nextAc="seek">
+              <p:cTn id="2" dur="indefinite" nodeType="mainSeq">
+                <p:childTnLst>
+                  <p:par>
+                    <p:cTn id="3" fill="hold">
+                      <p:stCondLst>
+                        <p:cond delay="indefinite"/>
+                      </p:stCondLst>
+                      <p:childTnLst>
+                        <p:par>
+                          <p:cTn id="4" fill="hold">
+                            <p:stCondLst>
+                              <p:cond delay="0"/>
+                            </p:stCondLst>
+                            <p:childTnLst>
+                              <p:par>
+                                <p:cTn id="5" presetID="1" presetClass="entr" presetSubtype="0" fill="hold" grpId="0" nodeType="clickEffect">
+                                  <p:stCondLst>
+                                    <p:cond delay="0"/>
+                                  </p:stCondLst>
+                                  <p:childTnLst>
+                                    <p:set>
+                                      <p:cBhvr>
+                                        <p:cTn id="6" dur="1" fill="hold">
+                                          <p:stCondLst>
+                                            <p:cond delay="0"/>
+                                          </p:stCondLst>
+                                        </p:cTn>
+                                        <p:tgtEl>
+                                          <p:spTgt spid="11"/>
+                                        </p:tgtEl>
+                                        <p:attrNameLst>
+                                          <p:attrName>style.visibility</p:attrName>
+                                        </p:attrNameLst>
+                                      </p:cBhvr>
+                                      <p:to>
+                                        <p:strVal val="visible"/>
+                                      </p:to>
+                                    </p:set>
+                                  </p:childTnLst>
+                                </p:cTn>
+                              </p:par>
+                            </p:childTnLst>
+                          </p:cTn>
+                        </p:par>
+                      </p:childTnLst>
+                    </p:cTn>
+                  </p:par>
+                </p:childTnLst>
+              </p:cTn>
+              <p:prevCondLst>
+                <p:cond evt="onPrev" delay="0">
+                  <p:tgtEl>
+                    <p:sldTgt/>
+                  </p:tgtEl>
+                </p:cond>
+              </p:prevCondLst>
+              <p:nextCondLst>
+                <p:cond evt="onNext" delay="0">
+                  <p:tgtEl>
+                    <p:sldTgt/>
+                  </p:tgtEl>
+                </p:cond>
+              </p:nextCondLst>
+            </p:seq>
+          </p:childTnLst>
+        </p:cTn>
+      </p:par>
+    </p:tnLst>
+    <p:bldLst>
+      <p:bldP spid="11" grpId="0" animBg="1"/>
+    </p:bldLst>
+  </p:timing>
 </p:sld>
 </file>
 
 <file path=ppt/slides/slide5.xml><?xml version="1.0" encoding="utf-8"?>
-<p:sld xmlns:a="http://schemas.openxmlformats.org/drawingml/2006/main" xmlns:p="http://schemas.openxmlformats.org/presentationml/2006/main" xmlns:r="http://schemas.openxmlformats.org/officeDocument/2006/relationships">
+<p:sld xmlns:a="http://schemas.openxmlformats.org/drawingml/2006/main" xmlns:r="http://schemas.openxmlformats.org/officeDocument/2006/relationships" xmlns:p="http://schemas.openxmlformats.org/presentationml/2006/main">
   <p:cSld>
     <p:bg>
       <p:bgPr>
@@ -4641,7 +4835,14 @@
         <p:cNvGrpSpPr/>
         <p:nvPr/>
       </p:nvGrpSpPr>
-      <p:grpSpPr/>
+      <p:grpSpPr>
+        <a:xfrm>
+          <a:off x="0" y="0"/>
+          <a:ext cx="0" cy="0"/>
+          <a:chOff x="0" y="0"/>
+          <a:chExt cx="0" cy="0"/>
+        </a:xfrm>
+      </p:grpSpPr>
       <p:sp>
         <p:nvSpPr>
           <p:cNvPr id="2" name="TextBox 1"/>
@@ -4717,6 +4918,7 @@
           <a:lstStyle/>
           <a:p>
             <a:pPr algn="ctr"/>
+            <a:endParaRPr/>
           </a:p>
         </p:txBody>
       </p:sp>
@@ -5047,7 +5249,7 @@
 </file>
 
 <file path=ppt/slides/slide6.xml><?xml version="1.0" encoding="utf-8"?>
-<p:sld xmlns:a="http://schemas.openxmlformats.org/drawingml/2006/main" xmlns:p="http://schemas.openxmlformats.org/presentationml/2006/main" xmlns:r="http://schemas.openxmlformats.org/officeDocument/2006/relationships">
+<p:sld xmlns:a="http://schemas.openxmlformats.org/drawingml/2006/main" xmlns:r="http://schemas.openxmlformats.org/officeDocument/2006/relationships" xmlns:p="http://schemas.openxmlformats.org/presentationml/2006/main">
   <p:cSld>
     <p:bg>
       <p:bgPr>
@@ -5063,7 +5265,14 @@
         <p:cNvGrpSpPr/>
         <p:nvPr/>
       </p:nvGrpSpPr>
-      <p:grpSpPr/>
+      <p:grpSpPr>
+        <a:xfrm>
+          <a:off x="0" y="0"/>
+          <a:ext cx="0" cy="0"/>
+          <a:chOff x="0" y="0"/>
+          <a:chExt cx="0" cy="0"/>
+        </a:xfrm>
+      </p:grpSpPr>
       <p:sp>
         <p:nvSpPr>
           <p:cNvPr id="2" name="TextBox 1"/>
@@ -5139,6 +5348,7 @@
           <a:lstStyle/>
           <a:p>
             <a:pPr algn="ctr"/>
+            <a:endParaRPr/>
           </a:p>
         </p:txBody>
       </p:sp>
@@ -5220,6 +5430,7 @@
           <a:lstStyle/>
           <a:p>
             <a:pPr algn="ctr"/>
+            <a:endParaRPr/>
           </a:p>
         </p:txBody>
       </p:sp>
@@ -5329,7 +5540,7 @@
         </p:nvSpPr>
         <p:spPr>
           <a:xfrm>
-            <a:off x="10515600" y="2286000"/>
+            <a:off x="9569885" y="2402840"/>
             <a:ext cx="457200" cy="457200"/>
           </a:xfrm>
           <a:prstGeom prst="rect">
@@ -5351,6 +5562,7 @@
               </a:defRPr>
             </a:pPr>
             <a:r>
+              <a:rPr dirty="0"/>
               <a:t>*</a:t>
             </a:r>
           </a:p>
@@ -5364,8 +5576,8 @@
         </p:nvSpPr>
         <p:spPr>
           <a:xfrm>
-            <a:off x="3355848" y="5486400"/>
-            <a:ext cx="5486400" cy="731520"/>
+            <a:off x="4179998" y="5577840"/>
+            <a:ext cx="3527204" cy="731520"/>
           </a:xfrm>
           <a:prstGeom prst="roundRect">
             <a:avLst/>
@@ -5394,7 +5606,7 @@
           </a:fontRef>
         </p:style>
         <p:txBody>
-          <a:bodyPr rtlCol="0" anchor="ctr" wrap="square"/>
+          <a:bodyPr wrap="square" rtlCol="0" anchor="ctr"/>
           <a:lstStyle/>
           <a:p>
             <a:pPr algn="ctr">
@@ -5415,11 +5627,89 @@
   <p:clrMapOvr>
     <a:masterClrMapping/>
   </p:clrMapOvr>
+  <p:timing>
+    <p:tnLst>
+      <p:par>
+        <p:cTn id="1" dur="indefinite" restart="never" nodeType="tmRoot">
+          <p:childTnLst>
+            <p:seq concurrent="1" nextAc="seek">
+              <p:cTn id="2" dur="indefinite" nodeType="mainSeq">
+                <p:childTnLst>
+                  <p:par>
+                    <p:cTn id="3" fill="hold">
+                      <p:stCondLst>
+                        <p:cond delay="indefinite"/>
+                      </p:stCondLst>
+                      <p:childTnLst>
+                        <p:par>
+                          <p:cTn id="4" fill="hold">
+                            <p:stCondLst>
+                              <p:cond delay="0"/>
+                            </p:stCondLst>
+                            <p:childTnLst>
+                              <p:par>
+                                <p:cTn id="5" presetID="1" presetClass="entr" presetSubtype="0" fill="hold" grpId="0" nodeType="clickEffect">
+                                  <p:stCondLst>
+                                    <p:cond delay="0"/>
+                                  </p:stCondLst>
+                                  <p:childTnLst>
+                                    <p:set>
+                                      <p:cBhvr>
+                                        <p:cTn id="6" dur="1" fill="hold">
+                                          <p:stCondLst>
+                                            <p:cond delay="0"/>
+                                          </p:stCondLst>
+                                        </p:cTn>
+                                        <p:tgtEl>
+                                          <p:spTgt spid="8"/>
+                                        </p:tgtEl>
+                                        <p:attrNameLst>
+                                          <p:attrName>style.visibility</p:attrName>
+                                        </p:attrNameLst>
+                                      </p:cBhvr>
+                                      <p:to>
+                                        <p:strVal val="visible"/>
+                                      </p:to>
+                                    </p:set>
+                                  </p:childTnLst>
+                                </p:cTn>
+                              </p:par>
+                            </p:childTnLst>
+                          </p:cTn>
+                        </p:par>
+                      </p:childTnLst>
+                    </p:cTn>
+                  </p:par>
+                </p:childTnLst>
+              </p:cTn>
+              <p:prevCondLst>
+                <p:cond evt="onPrev" delay="0">
+                  <p:tgtEl>
+                    <p:sldTgt/>
+                  </p:tgtEl>
+                </p:cond>
+              </p:prevCondLst>
+              <p:nextCondLst>
+                <p:cond evt="onNext" delay="0">
+                  <p:tgtEl>
+                    <p:sldTgt/>
+                  </p:tgtEl>
+                </p:cond>
+              </p:nextCondLst>
+            </p:seq>
+          </p:childTnLst>
+        </p:cTn>
+      </p:par>
+    </p:tnLst>
+    <p:bldLst>
+      <p:bldP spid="8" grpId="0" animBg="1"/>
+    </p:bldLst>
+  </p:timing>
 </p:sld>
 </file>
 
 <file path=ppt/slides/slide7.xml><?xml version="1.0" encoding="utf-8"?>
-<p:sld xmlns:a="http://schemas.openxmlformats.org/drawingml/2006/main" xmlns:p="http://schemas.openxmlformats.org/presentationml/2006/main" xmlns:r="http://schemas.openxmlformats.org/officeDocument/2006/relationships">
+<p:sld xmlns:a="http://schemas.openxmlformats.org/drawingml/2006/main" xmlns:r="http://schemas.openxmlformats.org/officeDocument/2006/relationships" xmlns:p="http://schemas.openxmlformats.org/presentationml/2006/main">
   <p:cSld>
     <p:bg>
       <p:bgPr>
@@ -5435,7 +5725,14 @@
         <p:cNvGrpSpPr/>
         <p:nvPr/>
       </p:nvGrpSpPr>
-      <p:grpSpPr/>
+      <p:grpSpPr>
+        <a:xfrm>
+          <a:off x="0" y="0"/>
+          <a:ext cx="0" cy="0"/>
+          <a:chOff x="0" y="0"/>
+          <a:chExt cx="0" cy="0"/>
+        </a:xfrm>
+      </p:grpSpPr>
       <p:sp>
         <p:nvSpPr>
           <p:cNvPr id="2" name="TextBox 1"/>
@@ -5511,6 +5808,7 @@
           <a:lstStyle/>
           <a:p>
             <a:pPr algn="ctr"/>
+            <a:endParaRPr/>
           </a:p>
         </p:txBody>
       </p:sp>
@@ -5829,7 +6127,7 @@
 </file>
 
 <file path=ppt/slides/slide8.xml><?xml version="1.0" encoding="utf-8"?>
-<p:sld xmlns:a="http://schemas.openxmlformats.org/drawingml/2006/main" xmlns:p="http://schemas.openxmlformats.org/presentationml/2006/main" xmlns:r="http://schemas.openxmlformats.org/officeDocument/2006/relationships">
+<p:sld xmlns:a="http://schemas.openxmlformats.org/drawingml/2006/main" xmlns:r="http://schemas.openxmlformats.org/officeDocument/2006/relationships" xmlns:p="http://schemas.openxmlformats.org/presentationml/2006/main">
   <p:cSld>
     <p:bg>
       <p:bgPr>
@@ -5845,7 +6143,14 @@
         <p:cNvGrpSpPr/>
         <p:nvPr/>
       </p:nvGrpSpPr>
-      <p:grpSpPr/>
+      <p:grpSpPr>
+        <a:xfrm>
+          <a:off x="0" y="0"/>
+          <a:ext cx="0" cy="0"/>
+          <a:chOff x="0" y="0"/>
+          <a:chExt cx="0" cy="0"/>
+        </a:xfrm>
+      </p:grpSpPr>
       <p:sp>
         <p:nvSpPr>
           <p:cNvPr id="2" name="TextBox 1"/>
@@ -5921,6 +6226,7 @@
           <a:lstStyle/>
           <a:p>
             <a:pPr algn="ctr"/>
+            <a:endParaRPr/>
           </a:p>
         </p:txBody>
       </p:sp>
@@ -6087,7 +6393,7 @@
 </file>
 
 <file path=ppt/slides/slide9.xml><?xml version="1.0" encoding="utf-8"?>
-<p:sld xmlns:a="http://schemas.openxmlformats.org/drawingml/2006/main" xmlns:p="http://schemas.openxmlformats.org/presentationml/2006/main" xmlns:r="http://schemas.openxmlformats.org/officeDocument/2006/relationships">
+<p:sld xmlns:a="http://schemas.openxmlformats.org/drawingml/2006/main" xmlns:r="http://schemas.openxmlformats.org/officeDocument/2006/relationships" xmlns:p="http://schemas.openxmlformats.org/presentationml/2006/main">
   <p:cSld>
     <p:bg>
       <p:bgPr>
@@ -6103,7 +6409,14 @@
         <p:cNvGrpSpPr/>
         <p:nvPr/>
       </p:nvGrpSpPr>
-      <p:grpSpPr/>
+      <p:grpSpPr>
+        <a:xfrm>
+          <a:off x="0" y="0"/>
+          <a:ext cx="0" cy="0"/>
+          <a:chOff x="0" y="0"/>
+          <a:chExt cx="0" cy="0"/>
+        </a:xfrm>
+      </p:grpSpPr>
       <p:sp>
         <p:nvSpPr>
           <p:cNvPr id="2" name="TextBox 1"/>
@@ -6179,6 +6492,7 @@
           <a:lstStyle/>
           <a:p>
             <a:pPr algn="ctr"/>
+            <a:endParaRPr/>
           </a:p>
         </p:txBody>
       </p:sp>

</xml_diff>

<commit_message>
Update NEOlyzer demo presentation
Co-Authored-By: Claude Opus 4.5 <noreply@anthropic.com>
</commit_message>
<xml_diff>
--- a/presentations/NEOlyzer_Demo.pptx
+++ b/presentations/NEOlyzer_Demo.pptx
@@ -6,15 +6,16 @@
   </p:sldMasterIdLst>
   <p:sldIdLst>
     <p:sldId id="256" r:id="rId2"/>
-    <p:sldId id="257" r:id="rId3"/>
-    <p:sldId id="258" r:id="rId4"/>
-    <p:sldId id="259" r:id="rId5"/>
-    <p:sldId id="260" r:id="rId6"/>
-    <p:sldId id="261" r:id="rId7"/>
-    <p:sldId id="262" r:id="rId8"/>
-    <p:sldId id="263" r:id="rId9"/>
-    <p:sldId id="264" r:id="rId10"/>
-    <p:sldId id="265" r:id="rId11"/>
+    <p:sldId id="266" r:id="rId3"/>
+    <p:sldId id="257" r:id="rId4"/>
+    <p:sldId id="258" r:id="rId5"/>
+    <p:sldId id="259" r:id="rId6"/>
+    <p:sldId id="260" r:id="rId7"/>
+    <p:sldId id="261" r:id="rId8"/>
+    <p:sldId id="262" r:id="rId9"/>
+    <p:sldId id="263" r:id="rId10"/>
+    <p:sldId id="264" r:id="rId11"/>
+    <p:sldId id="265" r:id="rId12"/>
   </p:sldIdLst>
   <p:sldSz cx="12192000" cy="6858000"/>
   <p:notesSz cx="6858000" cy="9144000"/>
@@ -3443,7 +3444,7 @@
     <p:bg>
       <p:bgPr>
         <a:solidFill>
-          <a:srgbClr val="2D3E83"/>
+          <a:srgbClr val="1A235B"/>
         </a:solidFill>
         <a:effectLst/>
       </p:bgPr>
@@ -3470,7 +3471,7 @@
         </p:nvSpPr>
         <p:spPr>
           <a:xfrm>
-            <a:off x="457352" y="1471808"/>
+            <a:off x="457200" y="274320"/>
             <a:ext cx="11277295" cy="1097280"/>
           </a:xfrm>
           <a:prstGeom prst="rect">
@@ -3485,15 +3486,14 @@
           <a:lstStyle/>
           <a:p>
             <a:pPr algn="ctr">
-              <a:defRPr sz="6000" b="1">
+              <a:defRPr sz="4400" b="1">
                 <a:solidFill>
                   <a:srgbClr val="FFFFFF"/>
                 </a:solidFill>
               </a:defRPr>
             </a:pPr>
             <a:r>
-              <a:rPr dirty="0"/>
-              <a:t>Live Demo</a:t>
+              <a:t>Future Directions</a:t>
             </a:r>
           </a:p>
         </p:txBody>
@@ -3506,7 +3506,7 @@
         </p:nvSpPr>
         <p:spPr>
           <a:xfrm>
-            <a:off x="3657752" y="2294768"/>
+            <a:off x="3657600" y="914400"/>
             <a:ext cx="4876495" cy="50800"/>
           </a:xfrm>
           <a:prstGeom prst="rect">
@@ -3550,8 +3550,8 @@
         </p:nvSpPr>
         <p:spPr>
           <a:xfrm>
-            <a:off x="685952" y="3026288"/>
-            <a:ext cx="10820095" cy="4572000"/>
+            <a:off x="685800" y="1371600"/>
+            <a:ext cx="10515600" cy="4572000"/>
           </a:xfrm>
           <a:prstGeom prst="rect">
             <a:avLst/>
@@ -3564,87 +3564,117 @@
           </a:bodyPr>
           <a:lstStyle/>
           <a:p>
-            <a:pPr algn="ctr">
-              <a:defRPr sz="2800">
-                <a:solidFill>
-                  <a:srgbClr val="8AB4D9"/>
-                </a:solidFill>
-              </a:defRPr>
-            </a:pPr>
-            <a:r>
-              <a:t>Projections  |  Filtering  |  Catalog Blinking  |  Animation</a:t>
-            </a:r>
-          </a:p>
-        </p:txBody>
-      </p:sp>
-      <p:sp>
-        <p:nvSpPr>
-          <p:cNvPr id="5" name="Oval 4"/>
-          <p:cNvSpPr/>
+            <a:pPr>
+              <a:lnSpc>
+                <a:spcPct val="150000"/>
+              </a:lnSpc>
+              <a:defRPr sz="2600">
+                <a:solidFill>
+                  <a:srgbClr val="FFFFFF"/>
+                </a:solidFill>
+              </a:defRPr>
+            </a:pPr>
+            <a:r>
+              <a:t>  NEOfixer integration</a:t>
+            </a:r>
+          </a:p>
+          <a:p>
+            <a:pPr>
+              <a:lnSpc>
+                <a:spcPct val="150000"/>
+              </a:lnSpc>
+              <a:defRPr sz="2600">
+                <a:solidFill>
+                  <a:srgbClr val="FFFFFF"/>
+                </a:solidFill>
+              </a:defRPr>
+            </a:pPr>
+            <a:r>
+              <a:t>     - Additional observational planning modes</a:t>
+            </a:r>
+          </a:p>
+          <a:p>
+            <a:pPr>
+              <a:lnSpc>
+                <a:spcPct val="150000"/>
+              </a:lnSpc>
+              <a:defRPr sz="2600">
+                <a:solidFill>
+                  <a:srgbClr val="FFFFFF"/>
+                </a:solidFill>
+              </a:defRPr>
+            </a:pPr>
+            <a:r>
+              <a:t>  Performance optimization for 100,000+ NEOs (catalog growing rapidly)</a:t>
+            </a:r>
+          </a:p>
+          <a:p>
+            <a:pPr>
+              <a:lnSpc>
+                <a:spcPct val="150000"/>
+              </a:lnSpc>
+              <a:defRPr sz="2600">
+                <a:solidFill>
+                  <a:srgbClr val="FFFFFF"/>
+                </a:solidFill>
+              </a:defRPr>
+            </a:pPr>
+            <a:r>
+              <a:t>  Database schema normalization as features expand</a:t>
+            </a:r>
+          </a:p>
+          <a:p>
+            <a:pPr>
+              <a:lnSpc>
+                <a:spcPct val="150000"/>
+              </a:lnSpc>
+              <a:defRPr sz="2600">
+                <a:solidFill>
+                  <a:srgbClr val="FFFFFF"/>
+                </a:solidFill>
+              </a:defRPr>
+            </a:pPr>
+            <a:r>
+              <a:t>  Community feedback and feature requests welcome</a:t>
+            </a:r>
+          </a:p>
+        </p:txBody>
+      </p:sp>
+      <p:sp>
+        <p:nvSpPr>
+          <p:cNvPr id="5" name="TextBox 4"/>
+          <p:cNvSpPr txBox="1"/>
           <p:nvPr/>
         </p:nvSpPr>
         <p:spPr>
           <a:xfrm>
-            <a:off x="5149596" y="4208056"/>
-            <a:ext cx="1892807" cy="1892807"/>
-          </a:xfrm>
-          <a:prstGeom prst="ellipse">
-            <a:avLst/>
-          </a:prstGeom>
-          <a:solidFill>
-            <a:srgbClr val="FFFFFF"/>
-          </a:solidFill>
-          <a:ln>
-            <a:noFill/>
-          </a:ln>
-        </p:spPr>
-        <p:style>
-          <a:lnRef idx="1">
-            <a:schemeClr val="accent1"/>
-          </a:lnRef>
-          <a:fillRef idx="3">
-            <a:schemeClr val="accent1"/>
-          </a:fillRef>
-          <a:effectRef idx="2">
-            <a:schemeClr val="accent1"/>
-          </a:effectRef>
-          <a:fontRef idx="minor">
-            <a:schemeClr val="lt1"/>
-          </a:fontRef>
-        </p:style>
-        <p:txBody>
-          <a:bodyPr rtlCol="0" anchor="ctr"/>
-          <a:lstStyle/>
-          <a:p>
-            <a:pPr algn="ctr"/>
-            <a:endParaRPr/>
-          </a:p>
-        </p:txBody>
-      </p:sp>
-      <p:pic>
-        <p:nvPicPr>
-          <p:cNvPr id="6" name="Picture 5" descr="CSS_logo_transparent.png"/>
-          <p:cNvPicPr>
-            <a:picLocks noChangeAspect="1"/>
-          </p:cNvPicPr>
-          <p:nvPr/>
-        </p:nvPicPr>
-        <p:blipFill>
-          <a:blip r:embed="rId2"/>
-          <a:stretch>
-            <a:fillRect/>
-          </a:stretch>
-        </p:blipFill>
-        <p:spPr>
-          <a:xfrm>
-            <a:off x="5273040" y="4331500"/>
-            <a:ext cx="1645920" cy="1645920"/>
+            <a:off x="685800" y="4754880"/>
+            <a:ext cx="10515600" cy="548640"/>
           </a:xfrm>
           <a:prstGeom prst="rect">
             <a:avLst/>
           </a:prstGeom>
-        </p:spPr>
-      </p:pic>
+          <a:noFill/>
+        </p:spPr>
+        <p:txBody>
+          <a:bodyPr wrap="none">
+            <a:spAutoFit/>
+          </a:bodyPr>
+          <a:lstStyle/>
+          <a:p>
+            <a:pPr>
+              <a:defRPr sz="2400" b="1">
+                <a:solidFill>
+                  <a:srgbClr val="FFC107"/>
+                </a:solidFill>
+              </a:defRPr>
+            </a:pPr>
+            <a:r>
+              <a:t>Contact: rseaman@arizona.edu</a:t>
+            </a:r>
+          </a:p>
+        </p:txBody>
+      </p:sp>
     </p:spTree>
   </p:cSld>
   <p:clrMapOvr>
@@ -3653,7 +3683,7 @@
 </p:sld>
 </file>
 
-<file path=ppt/slides/slide2.xml><?xml version="1.0" encoding="utf-8"?>
+<file path=ppt/slides/slide11.xml><?xml version="1.0" encoding="utf-8"?>
 <p:sld xmlns:a="http://schemas.openxmlformats.org/drawingml/2006/main" xmlns:r="http://schemas.openxmlformats.org/officeDocument/2006/relationships" xmlns:p="http://schemas.openxmlformats.org/presentationml/2006/main">
   <p:cSld>
     <p:bg>
@@ -3686,7 +3716,7 @@
         </p:nvSpPr>
         <p:spPr>
           <a:xfrm>
-            <a:off x="457200" y="365760"/>
+            <a:off x="457352" y="1471808"/>
             <a:ext cx="11277295" cy="1097280"/>
           </a:xfrm>
           <a:prstGeom prst="rect">
@@ -3701,14 +3731,15 @@
           <a:lstStyle/>
           <a:p>
             <a:pPr algn="ctr">
-              <a:defRPr sz="4000" b="1">
+              <a:defRPr sz="6000" b="1">
                 <a:solidFill>
                   <a:srgbClr val="FFFFFF"/>
                 </a:solidFill>
               </a:defRPr>
             </a:pPr>
             <a:r>
-              <a:t>How This Presentation Was Made</a:t>
+              <a:rPr dirty="0"/>
+              <a:t>Live Demo</a:t>
             </a:r>
           </a:p>
         </p:txBody>
@@ -3721,7 +3752,7 @@
         </p:nvSpPr>
         <p:spPr>
           <a:xfrm>
-            <a:off x="3657600" y="1005840"/>
+            <a:off x="3657752" y="2294768"/>
             <a:ext cx="4876495" cy="50800"/>
           </a:xfrm>
           <a:prstGeom prst="rect">
@@ -3765,8 +3796,8 @@
         </p:nvSpPr>
         <p:spPr>
           <a:xfrm>
-            <a:off x="914400" y="1645920"/>
-            <a:ext cx="10362895" cy="2743200"/>
+            <a:off x="685952" y="3026288"/>
+            <a:ext cx="10820095" cy="4572000"/>
           </a:xfrm>
           <a:prstGeom prst="rect">
             <a:avLst/>
@@ -3779,75 +3810,87 @@
           </a:bodyPr>
           <a:lstStyle/>
           <a:p>
-            <a:pPr>
-              <a:defRPr sz="2600" i="1">
-                <a:solidFill>
-                  <a:srgbClr val="FFFFFF"/>
-                </a:solidFill>
-              </a:defRPr>
-            </a:pPr>
-            <a:r>
-              <a:t>Good morning. It's been a few days since I worked on this. I need to create</a:t>
-            </a:r>
-            <a:br/>
-            <a:r>
-              <a:t>a demo of NEOlyzer. Perhaps you can remind me - and yourself - of its high</a:t>
-            </a:r>
-            <a:br/>
-            <a:r>
-              <a:t>points. Hmm. For that matter, I have both Powerpoint and Keynote on this</a:t>
-            </a:r>
-            <a:br/>
-            <a:r>
-              <a:t>computer. Can you directly create a presentation while I kibitz?</a:t>
-            </a:r>
-          </a:p>
-        </p:txBody>
-      </p:sp>
-      <p:sp>
-        <p:nvSpPr>
-          <p:cNvPr id="5" name="TextBox 4"/>
-          <p:cNvSpPr txBox="1"/>
+            <a:pPr algn="ctr">
+              <a:defRPr sz="2800">
+                <a:solidFill>
+                  <a:srgbClr val="8AB4D9"/>
+                </a:solidFill>
+              </a:defRPr>
+            </a:pPr>
+            <a:r>
+              <a:t>Projections  |  Filtering  |  Catalog Blinking  |  Animation</a:t>
+            </a:r>
+          </a:p>
+        </p:txBody>
+      </p:sp>
+      <p:sp>
+        <p:nvSpPr>
+          <p:cNvPr id="5" name="Oval 4"/>
+          <p:cNvSpPr/>
           <p:nvPr/>
         </p:nvSpPr>
         <p:spPr>
           <a:xfrm>
-            <a:off x="685800" y="4389120"/>
-            <a:ext cx="10820095" cy="4572000"/>
+            <a:off x="5149596" y="4208056"/>
+            <a:ext cx="1892807" cy="1892807"/>
+          </a:xfrm>
+          <a:prstGeom prst="ellipse">
+            <a:avLst/>
+          </a:prstGeom>
+          <a:solidFill>
+            <a:srgbClr val="FFFFFF"/>
+          </a:solidFill>
+          <a:ln>
+            <a:noFill/>
+          </a:ln>
+        </p:spPr>
+        <p:style>
+          <a:lnRef idx="1">
+            <a:schemeClr val="accent1"/>
+          </a:lnRef>
+          <a:fillRef idx="3">
+            <a:schemeClr val="accent1"/>
+          </a:fillRef>
+          <a:effectRef idx="2">
+            <a:schemeClr val="accent1"/>
+          </a:effectRef>
+          <a:fontRef idx="minor">
+            <a:schemeClr val="lt1"/>
+          </a:fontRef>
+        </p:style>
+        <p:txBody>
+          <a:bodyPr rtlCol="0" anchor="ctr"/>
+          <a:lstStyle/>
+          <a:p>
+            <a:pPr algn="ctr"/>
+            <a:endParaRPr/>
+          </a:p>
+        </p:txBody>
+      </p:sp>
+      <p:pic>
+        <p:nvPicPr>
+          <p:cNvPr id="6" name="Picture 5" descr="CSS_logo_transparent.png"/>
+          <p:cNvPicPr>
+            <a:picLocks noChangeAspect="1"/>
+          </p:cNvPicPr>
+          <p:nvPr/>
+        </p:nvPicPr>
+        <p:blipFill>
+          <a:blip r:embed="rId2"/>
+          <a:stretch>
+            <a:fillRect/>
+          </a:stretch>
+        </p:blipFill>
+        <p:spPr>
+          <a:xfrm>
+            <a:off x="5273040" y="4331500"/>
+            <a:ext cx="1645920" cy="1645920"/>
           </a:xfrm>
           <a:prstGeom prst="rect">
             <a:avLst/>
           </a:prstGeom>
-          <a:noFill/>
-        </p:spPr>
-        <p:txBody>
-          <a:bodyPr wrap="square">
-            <a:spAutoFit/>
-          </a:bodyPr>
-          <a:lstStyle/>
-          <a:p>
-            <a:pPr>
-              <a:defRPr sz="2200">
-                <a:solidFill>
-                  <a:srgbClr val="8AB4D9"/>
-                </a:solidFill>
-              </a:defRPr>
-            </a:pPr>
-            <a:r>
-              <a:t>This presentation was generated by Claude Code from a conversational prompt.</a:t>
-            </a:r>
-            <a:br/>
-            <a:br/>
-            <a:r>
-              <a:t>NEOlyzer itself was developed through AI-assisted programming, achieving</a:t>
-            </a:r>
-            <a:br/>
-            <a:r>
-              <a:t>a Minimum Viable Product in a few days. Total effort was about two weeks.</a:t>
-            </a:r>
-          </a:p>
-        </p:txBody>
-      </p:sp>
+        </p:spPr>
+      </p:pic>
     </p:spTree>
   </p:cSld>
   <p:clrMapOvr>
@@ -3856,7 +3899,667 @@
 </p:sld>
 </file>
 
+<file path=ppt/slides/slide2.xml><?xml version="1.0" encoding="utf-8"?>
+<p:sld xmlns:a="http://schemas.openxmlformats.org/drawingml/2006/main" xmlns:r="http://schemas.openxmlformats.org/officeDocument/2006/relationships" xmlns:p="http://schemas.openxmlformats.org/presentationml/2006/main">
+  <p:cSld>
+    <p:bg>
+      <p:bgPr>
+        <a:solidFill>
+          <a:srgbClr val="1A235B"/>
+        </a:solidFill>
+        <a:effectLst/>
+      </p:bgPr>
+    </p:bg>
+    <p:spTree>
+      <p:nvGrpSpPr>
+        <p:cNvPr id="1" name="">
+          <a:extLst>
+            <a:ext uri="{FF2B5EF4-FFF2-40B4-BE49-F238E27FC236}">
+              <a16:creationId xmlns:a16="http://schemas.microsoft.com/office/drawing/2014/main" id="{CDD51D9F-5CDA-A366-EB40-90783E811E9D}"/>
+            </a:ext>
+          </a:extLst>
+        </p:cNvPr>
+        <p:cNvGrpSpPr/>
+        <p:nvPr/>
+      </p:nvGrpSpPr>
+      <p:grpSpPr>
+        <a:xfrm>
+          <a:off x="0" y="0"/>
+          <a:ext cx="0" cy="0"/>
+          <a:chOff x="0" y="0"/>
+          <a:chExt cx="0" cy="0"/>
+        </a:xfrm>
+      </p:grpSpPr>
+      <p:sp>
+        <p:nvSpPr>
+          <p:cNvPr id="2" name="TextBox 1">
+            <a:extLst>
+              <a:ext uri="{FF2B5EF4-FFF2-40B4-BE49-F238E27FC236}">
+                <a16:creationId xmlns:a16="http://schemas.microsoft.com/office/drawing/2014/main" id="{51EBF72A-FE85-DEF2-282F-A60E3CA18019}"/>
+              </a:ext>
+            </a:extLst>
+          </p:cNvPr>
+          <p:cNvSpPr txBox="1"/>
+          <p:nvPr/>
+        </p:nvSpPr>
+        <p:spPr>
+          <a:xfrm>
+            <a:off x="457200" y="274320"/>
+            <a:ext cx="11277295" cy="769441"/>
+          </a:xfrm>
+          <a:prstGeom prst="rect">
+            <a:avLst/>
+          </a:prstGeom>
+          <a:noFill/>
+        </p:spPr>
+        <p:txBody>
+          <a:bodyPr wrap="square">
+            <a:spAutoFit/>
+          </a:bodyPr>
+          <a:lstStyle/>
+          <a:p>
+            <a:pPr algn="ctr">
+              <a:defRPr sz="4400" b="1">
+                <a:solidFill>
+                  <a:srgbClr val="FFFFFF"/>
+                </a:solidFill>
+              </a:defRPr>
+            </a:pPr>
+            <a:r>
+              <a:rPr dirty="0"/>
+              <a:t>Wh</a:t>
+            </a:r>
+            <a:r>
+              <a:rPr lang="en-US" dirty="0"/>
+              <a:t>y</a:t>
+            </a:r>
+            <a:r>
+              <a:rPr dirty="0"/>
+              <a:t> </a:t>
+            </a:r>
+            <a:r>
+              <a:rPr dirty="0" err="1"/>
+              <a:t>NEOlyzer</a:t>
+            </a:r>
+            <a:r>
+              <a:rPr dirty="0"/>
+              <a:t>?</a:t>
+            </a:r>
+          </a:p>
+        </p:txBody>
+      </p:sp>
+      <p:sp>
+        <p:nvSpPr>
+          <p:cNvPr id="3" name="Rectangle 2">
+            <a:extLst>
+              <a:ext uri="{FF2B5EF4-FFF2-40B4-BE49-F238E27FC236}">
+                <a16:creationId xmlns:a16="http://schemas.microsoft.com/office/drawing/2014/main" id="{D68E5988-539A-5080-90E3-6E4C0CDA1917}"/>
+              </a:ext>
+            </a:extLst>
+          </p:cNvPr>
+          <p:cNvSpPr/>
+          <p:nvPr/>
+        </p:nvSpPr>
+        <p:spPr>
+          <a:xfrm>
+            <a:off x="3657600" y="914400"/>
+            <a:ext cx="4876495" cy="50800"/>
+          </a:xfrm>
+          <a:prstGeom prst="rect">
+            <a:avLst/>
+          </a:prstGeom>
+          <a:solidFill>
+            <a:srgbClr val="FFC107"/>
+          </a:solidFill>
+          <a:ln>
+            <a:noFill/>
+          </a:ln>
+        </p:spPr>
+        <p:style>
+          <a:lnRef idx="1">
+            <a:schemeClr val="accent1"/>
+          </a:lnRef>
+          <a:fillRef idx="3">
+            <a:schemeClr val="accent1"/>
+          </a:fillRef>
+          <a:effectRef idx="2">
+            <a:schemeClr val="accent1"/>
+          </a:effectRef>
+          <a:fontRef idx="minor">
+            <a:schemeClr val="lt1"/>
+          </a:fontRef>
+        </p:style>
+        <p:txBody>
+          <a:bodyPr rtlCol="0" anchor="ctr"/>
+          <a:lstStyle/>
+          <a:p>
+            <a:pPr algn="ctr"/>
+            <a:endParaRPr/>
+          </a:p>
+        </p:txBody>
+      </p:sp>
+      <p:sp>
+        <p:nvSpPr>
+          <p:cNvPr id="4" name="TextBox 3">
+            <a:extLst>
+              <a:ext uri="{FF2B5EF4-FFF2-40B4-BE49-F238E27FC236}">
+                <a16:creationId xmlns:a16="http://schemas.microsoft.com/office/drawing/2014/main" id="{7AC119C7-0DAD-4828-8D3A-F45E9BCB0649}"/>
+              </a:ext>
+            </a:extLst>
+          </p:cNvPr>
+          <p:cNvSpPr txBox="1"/>
+          <p:nvPr/>
+        </p:nvSpPr>
+        <p:spPr>
+          <a:xfrm>
+            <a:off x="685800" y="1371600"/>
+            <a:ext cx="10515600" cy="5282665"/>
+          </a:xfrm>
+          <a:prstGeom prst="rect">
+            <a:avLst/>
+          </a:prstGeom>
+          <a:noFill/>
+        </p:spPr>
+        <p:txBody>
+          <a:bodyPr wrap="square">
+            <a:spAutoFit/>
+          </a:bodyPr>
+          <a:lstStyle/>
+          <a:p>
+            <a:pPr algn="ctr">
+              <a:defRPr sz="2800">
+                <a:solidFill>
+                  <a:srgbClr val="FFFFFF"/>
+                </a:solidFill>
+              </a:defRPr>
+            </a:pPr>
+            <a:r>
+              <a:rPr lang="en-US" sz="3200" i="1" dirty="0">
+                <a:solidFill>
+                  <a:srgbClr val="FFC107"/>
+                </a:solidFill>
+              </a:rPr>
+              <a:t>Unlike the </a:t>
+            </a:r>
+            <a:r>
+              <a:rPr lang="en-US" sz="3200" i="1" dirty="0" err="1">
+                <a:solidFill>
+                  <a:srgbClr val="FFC107"/>
+                </a:solidFill>
+              </a:rPr>
+              <a:t>Neuralyzer</a:t>
+            </a:r>
+            <a:r>
+              <a:rPr lang="en-US" sz="3200" i="1" dirty="0">
+                <a:solidFill>
+                  <a:srgbClr val="FFC107"/>
+                </a:solidFill>
+              </a:rPr>
+              <a:t> in MiB, </a:t>
+            </a:r>
+            <a:r>
+              <a:rPr lang="en-US" sz="3200" i="1" dirty="0" err="1">
+                <a:solidFill>
+                  <a:srgbClr val="FFC107"/>
+                </a:solidFill>
+              </a:rPr>
+              <a:t>NEOlyzer</a:t>
+            </a:r>
+            <a:r>
+              <a:rPr lang="en-US" sz="3200" i="1" dirty="0">
+                <a:solidFill>
+                  <a:srgbClr val="FFC107"/>
+                </a:solidFill>
+              </a:rPr>
+              <a:t> helps</a:t>
+            </a:r>
+          </a:p>
+          <a:p>
+            <a:pPr algn="ctr">
+              <a:defRPr sz="2800">
+                <a:solidFill>
+                  <a:srgbClr val="FFFFFF"/>
+                </a:solidFill>
+              </a:defRPr>
+            </a:pPr>
+            <a:r>
+              <a:rPr lang="en-US" sz="3200" i="1" dirty="0">
+                <a:solidFill>
+                  <a:srgbClr val="FFC107"/>
+                </a:solidFill>
+              </a:rPr>
+              <a:t>you remember information about NEOs</a:t>
+            </a:r>
+          </a:p>
+          <a:p>
+            <a:pPr algn="ctr">
+              <a:defRPr sz="2800">
+                <a:solidFill>
+                  <a:srgbClr val="FFFFFF"/>
+                </a:solidFill>
+              </a:defRPr>
+            </a:pPr>
+            <a:endParaRPr lang="en-US" sz="1400" i="1" dirty="0">
+              <a:solidFill>
+                <a:srgbClr val="FFC108"/>
+              </a:solidFill>
+            </a:endParaRPr>
+          </a:p>
+          <a:p>
+            <a:pPr marL="514350" indent="-514350">
+              <a:lnSpc>
+                <a:spcPct val="150000"/>
+              </a:lnSpc>
+              <a:buFont typeface="+mj-lt"/>
+              <a:buAutoNum type="arabicPeriod"/>
+              <a:defRPr sz="2800">
+                <a:solidFill>
+                  <a:srgbClr val="FFFFFF"/>
+                </a:solidFill>
+              </a:defRPr>
+            </a:pPr>
+            <a:r>
+              <a:rPr lang="en-US" sz="3200" dirty="0"/>
+              <a:t>Rich i</a:t>
+            </a:r>
+            <a:r>
+              <a:rPr sz="3200" dirty="0"/>
+              <a:t>nteractive visualization of </a:t>
+            </a:r>
+            <a:r>
+              <a:rPr lang="en-US" sz="3200" dirty="0" err="1"/>
+              <a:t>NEA.txt</a:t>
+            </a:r>
+            <a:endParaRPr lang="en-US" sz="3200" dirty="0"/>
+          </a:p>
+          <a:p>
+            <a:pPr marL="971550" lvl="1" indent="-514350">
+              <a:lnSpc>
+                <a:spcPct val="150000"/>
+              </a:lnSpc>
+              <a:buFont typeface="Arial" panose="020B0604020202020204" pitchFamily="34" charset="0"/>
+              <a:buChar char="•"/>
+              <a:defRPr sz="2800">
+                <a:solidFill>
+                  <a:srgbClr val="FFFFFF"/>
+                </a:solidFill>
+              </a:defRPr>
+            </a:pPr>
+            <a:r>
+              <a:rPr lang="en-US" sz="2400" dirty="0"/>
+              <a:t>Data fusion with SBDB, SBN </a:t>
+            </a:r>
+            <a:r>
+              <a:rPr lang="en-US" sz="2400" dirty="0" err="1"/>
+              <a:t>postgres</a:t>
+            </a:r>
+            <a:r>
+              <a:rPr lang="en-US" sz="2400" dirty="0"/>
+              <a:t> DB, and others </a:t>
+            </a:r>
+            <a:r>
+              <a:rPr lang="en-US" sz="1600" i="1" dirty="0"/>
+              <a:t>(ETL = Extract, Transform, Load)</a:t>
+            </a:r>
+          </a:p>
+          <a:p>
+            <a:pPr marL="971550" lvl="1" indent="-514350">
+              <a:lnSpc>
+                <a:spcPct val="150000"/>
+              </a:lnSpc>
+              <a:buFont typeface="Arial" panose="020B0604020202020204" pitchFamily="34" charset="0"/>
+              <a:buChar char="•"/>
+              <a:defRPr sz="2800">
+                <a:solidFill>
+                  <a:srgbClr val="FFFFFF"/>
+                </a:solidFill>
+              </a:defRPr>
+            </a:pPr>
+            <a:r>
+              <a:rPr lang="en-US" sz="2400" dirty="0"/>
+              <a:t>Database queries are as important as visualization</a:t>
+            </a:r>
+          </a:p>
+          <a:p>
+            <a:pPr marL="971550" lvl="1" indent="-514350">
+              <a:lnSpc>
+                <a:spcPct val="150000"/>
+              </a:lnSpc>
+              <a:buFont typeface="Arial" panose="020B0604020202020204" pitchFamily="34" charset="0"/>
+              <a:buChar char="•"/>
+              <a:defRPr sz="2800">
+                <a:solidFill>
+                  <a:srgbClr val="FFFFFF"/>
+                </a:solidFill>
+              </a:defRPr>
+            </a:pPr>
+            <a:endParaRPr sz="1400" dirty="0"/>
+          </a:p>
+          <a:p>
+            <a:pPr marL="514350" indent="-514350">
+              <a:lnSpc>
+                <a:spcPct val="150000"/>
+              </a:lnSpc>
+              <a:buFont typeface="+mj-lt"/>
+              <a:buAutoNum type="arabicPeriod"/>
+              <a:defRPr sz="2800">
+                <a:solidFill>
+                  <a:srgbClr val="FFFFFF"/>
+                </a:solidFill>
+              </a:defRPr>
+            </a:pPr>
+            <a:r>
+              <a:rPr sz="3200" dirty="0"/>
+              <a:t>  </a:t>
+            </a:r>
+            <a:r>
+              <a:rPr lang="en-US" sz="3200" dirty="0"/>
+              <a:t>Explore what’s possible with AI coding techniques in 2026</a:t>
+            </a:r>
+          </a:p>
+          <a:p>
+            <a:pPr marL="971550" lvl="1" indent="-514350">
+              <a:lnSpc>
+                <a:spcPct val="150000"/>
+              </a:lnSpc>
+              <a:buFont typeface="Arial" panose="020B0604020202020204" pitchFamily="34" charset="0"/>
+              <a:buChar char="•"/>
+              <a:defRPr sz="2800">
+                <a:solidFill>
+                  <a:srgbClr val="FFFFFF"/>
+                </a:solidFill>
+              </a:defRPr>
+            </a:pPr>
+            <a:r>
+              <a:rPr lang="en-US" sz="2400" dirty="0"/>
+              <a:t>“Quite a bit” is the answer</a:t>
+            </a:r>
+          </a:p>
+          <a:p>
+            <a:pPr marL="971550" lvl="1" indent="-514350">
+              <a:lnSpc>
+                <a:spcPct val="150000"/>
+              </a:lnSpc>
+              <a:buFont typeface="Arial" panose="020B0604020202020204" pitchFamily="34" charset="0"/>
+              <a:buChar char="•"/>
+              <a:defRPr sz="2800">
+                <a:solidFill>
+                  <a:srgbClr val="FFFFFF"/>
+                </a:solidFill>
+              </a:defRPr>
+            </a:pPr>
+            <a:r>
+              <a:rPr lang="en-US" sz="2400" dirty="0"/>
+              <a:t>Human input remains critical to success</a:t>
+            </a:r>
+          </a:p>
+        </p:txBody>
+      </p:sp>
+    </p:spTree>
+    <p:extLst>
+      <p:ext uri="{BB962C8B-B14F-4D97-AF65-F5344CB8AC3E}">
+        <p14:creationId xmlns:p14="http://schemas.microsoft.com/office/powerpoint/2010/main" val="3701854283"/>
+      </p:ext>
+    </p:extLst>
+  </p:cSld>
+  <p:clrMapOvr>
+    <a:masterClrMapping/>
+  </p:clrMapOvr>
+</p:sld>
+</file>
+
 <file path=ppt/slides/slide3.xml><?xml version="1.0" encoding="utf-8"?>
+<p:sld xmlns:a="http://schemas.openxmlformats.org/drawingml/2006/main" xmlns:r="http://schemas.openxmlformats.org/officeDocument/2006/relationships" xmlns:p="http://schemas.openxmlformats.org/presentationml/2006/main">
+  <p:cSld>
+    <p:bg>
+      <p:bgPr>
+        <a:solidFill>
+          <a:srgbClr val="2D3E83"/>
+        </a:solidFill>
+        <a:effectLst/>
+      </p:bgPr>
+    </p:bg>
+    <p:spTree>
+      <p:nvGrpSpPr>
+        <p:cNvPr id="1" name=""/>
+        <p:cNvGrpSpPr/>
+        <p:nvPr/>
+      </p:nvGrpSpPr>
+      <p:grpSpPr>
+        <a:xfrm>
+          <a:off x="0" y="0"/>
+          <a:ext cx="0" cy="0"/>
+          <a:chOff x="0" y="0"/>
+          <a:chExt cx="0" cy="0"/>
+        </a:xfrm>
+      </p:grpSpPr>
+      <p:sp>
+        <p:nvSpPr>
+          <p:cNvPr id="2" name="TextBox 1"/>
+          <p:cNvSpPr txBox="1"/>
+          <p:nvPr/>
+        </p:nvSpPr>
+        <p:spPr>
+          <a:xfrm>
+            <a:off x="457200" y="365760"/>
+            <a:ext cx="11277295" cy="1097280"/>
+          </a:xfrm>
+          <a:prstGeom prst="rect">
+            <a:avLst/>
+          </a:prstGeom>
+          <a:noFill/>
+        </p:spPr>
+        <p:txBody>
+          <a:bodyPr wrap="square">
+            <a:spAutoFit/>
+          </a:bodyPr>
+          <a:lstStyle/>
+          <a:p>
+            <a:pPr algn="ctr">
+              <a:defRPr sz="4000" b="1">
+                <a:solidFill>
+                  <a:srgbClr val="FFFFFF"/>
+                </a:solidFill>
+              </a:defRPr>
+            </a:pPr>
+            <a:r>
+              <a:t>How This Presentation Was Made</a:t>
+            </a:r>
+          </a:p>
+        </p:txBody>
+      </p:sp>
+      <p:sp>
+        <p:nvSpPr>
+          <p:cNvPr id="3" name="Rectangle 2"/>
+          <p:cNvSpPr/>
+          <p:nvPr/>
+        </p:nvSpPr>
+        <p:spPr>
+          <a:xfrm>
+            <a:off x="3657600" y="1005840"/>
+            <a:ext cx="4876495" cy="50800"/>
+          </a:xfrm>
+          <a:prstGeom prst="rect">
+            <a:avLst/>
+          </a:prstGeom>
+          <a:solidFill>
+            <a:srgbClr val="FFC107"/>
+          </a:solidFill>
+          <a:ln>
+            <a:noFill/>
+          </a:ln>
+        </p:spPr>
+        <p:style>
+          <a:lnRef idx="1">
+            <a:schemeClr val="accent1"/>
+          </a:lnRef>
+          <a:fillRef idx="3">
+            <a:schemeClr val="accent1"/>
+          </a:fillRef>
+          <a:effectRef idx="2">
+            <a:schemeClr val="accent1"/>
+          </a:effectRef>
+          <a:fontRef idx="minor">
+            <a:schemeClr val="lt1"/>
+          </a:fontRef>
+        </p:style>
+        <p:txBody>
+          <a:bodyPr rtlCol="0" anchor="ctr"/>
+          <a:lstStyle/>
+          <a:p>
+            <a:pPr algn="ctr"/>
+            <a:endParaRPr/>
+          </a:p>
+        </p:txBody>
+      </p:sp>
+      <p:sp>
+        <p:nvSpPr>
+          <p:cNvPr id="4" name="TextBox 3"/>
+          <p:cNvSpPr txBox="1"/>
+          <p:nvPr/>
+        </p:nvSpPr>
+        <p:spPr>
+          <a:xfrm>
+            <a:off x="914400" y="1645920"/>
+            <a:ext cx="10362895" cy="1692771"/>
+          </a:xfrm>
+          <a:prstGeom prst="rect">
+            <a:avLst/>
+          </a:prstGeom>
+          <a:noFill/>
+        </p:spPr>
+        <p:txBody>
+          <a:bodyPr wrap="square">
+            <a:spAutoFit/>
+          </a:bodyPr>
+          <a:lstStyle/>
+          <a:p>
+            <a:pPr>
+              <a:defRPr sz="2600" i="1">
+                <a:solidFill>
+                  <a:srgbClr val="FFFFFF"/>
+                </a:solidFill>
+              </a:defRPr>
+            </a:pPr>
+            <a:r>
+              <a:rPr lang="en-US" dirty="0"/>
+              <a:t>“</a:t>
+            </a:r>
+            <a:r>
+              <a:rPr dirty="0"/>
+              <a:t>Good morning. It's been a few days since I worked on this. I need to create</a:t>
+            </a:r>
+            <a:br>
+              <a:rPr dirty="0"/>
+            </a:br>
+            <a:r>
+              <a:rPr dirty="0"/>
+              <a:t>a demo of </a:t>
+            </a:r>
+            <a:r>
+              <a:rPr dirty="0" err="1"/>
+              <a:t>NEOlyzer</a:t>
+            </a:r>
+            <a:r>
+              <a:rPr dirty="0"/>
+              <a:t>. Perhaps you can remind me - and yourself - of its high</a:t>
+            </a:r>
+            <a:br>
+              <a:rPr dirty="0"/>
+            </a:br>
+            <a:r>
+              <a:rPr dirty="0"/>
+              <a:t>points. Hmm. For that matter, I have both </a:t>
+            </a:r>
+            <a:r>
+              <a:rPr dirty="0" err="1"/>
+              <a:t>Powerpoint</a:t>
+            </a:r>
+            <a:r>
+              <a:rPr dirty="0"/>
+              <a:t> and Keynote on this</a:t>
+            </a:r>
+            <a:br>
+              <a:rPr dirty="0"/>
+            </a:br>
+            <a:r>
+              <a:rPr dirty="0"/>
+              <a:t>computer. Can you directly create a presentation while I kibitz?</a:t>
+            </a:r>
+            <a:r>
+              <a:rPr lang="en-US" dirty="0"/>
+              <a:t>"</a:t>
+            </a:r>
+            <a:endParaRPr dirty="0"/>
+          </a:p>
+        </p:txBody>
+      </p:sp>
+      <p:sp>
+        <p:nvSpPr>
+          <p:cNvPr id="5" name="TextBox 4"/>
+          <p:cNvSpPr txBox="1"/>
+          <p:nvPr/>
+        </p:nvSpPr>
+        <p:spPr>
+          <a:xfrm>
+            <a:off x="685800" y="4389120"/>
+            <a:ext cx="10820095" cy="4572000"/>
+          </a:xfrm>
+          <a:prstGeom prst="rect">
+            <a:avLst/>
+          </a:prstGeom>
+          <a:noFill/>
+        </p:spPr>
+        <p:txBody>
+          <a:bodyPr wrap="square">
+            <a:spAutoFit/>
+          </a:bodyPr>
+          <a:lstStyle/>
+          <a:p>
+            <a:pPr>
+              <a:defRPr sz="2200">
+                <a:solidFill>
+                  <a:srgbClr val="8AB4D9"/>
+                </a:solidFill>
+              </a:defRPr>
+            </a:pPr>
+            <a:r>
+              <a:rPr dirty="0"/>
+              <a:t>This presentation was generated by Claude Code from a conversational prompt.</a:t>
+            </a:r>
+            <a:br>
+              <a:rPr dirty="0"/>
+            </a:br>
+            <a:br>
+              <a:rPr dirty="0"/>
+            </a:br>
+            <a:r>
+              <a:rPr dirty="0" err="1"/>
+              <a:t>NEOlyzer</a:t>
+            </a:r>
+            <a:r>
+              <a:rPr dirty="0"/>
+              <a:t> itself was developed through AI-assisted programming, achieving</a:t>
+            </a:r>
+            <a:br>
+              <a:rPr dirty="0"/>
+            </a:br>
+            <a:r>
+              <a:rPr dirty="0"/>
+              <a:t>a Minimum Viable Product in a few days. Total effort was about two weeks.</a:t>
+            </a:r>
+          </a:p>
+        </p:txBody>
+      </p:sp>
+    </p:spTree>
+  </p:cSld>
+  <p:clrMapOvr>
+    <a:masterClrMapping/>
+  </p:clrMapOvr>
+</p:sld>
+</file>
+
+<file path=ppt/slides/slide4.xml><?xml version="1.0" encoding="utf-8"?>
 <p:sld xmlns:a="http://schemas.openxmlformats.org/drawingml/2006/main" xmlns:r="http://schemas.openxmlformats.org/officeDocument/2006/relationships" xmlns:p="http://schemas.openxmlformats.org/presentationml/2006/main">
   <p:cSld>
     <p:bg>
@@ -4233,7 +4936,7 @@
 </p:sld>
 </file>
 
-<file path=ppt/slides/slide4.xml><?xml version="1.0" encoding="utf-8"?>
+<file path=ppt/slides/slide5.xml><?xml version="1.0" encoding="utf-8"?>
 <p:sld xmlns:a="http://schemas.openxmlformats.org/drawingml/2006/main" xmlns:r="http://schemas.openxmlformats.org/officeDocument/2006/relationships" xmlns:p="http://schemas.openxmlformats.org/presentationml/2006/main">
   <p:cSld>
     <p:bg>
@@ -4673,6 +5376,7 @@
               </a:defRPr>
             </a:pPr>
             <a:r>
+              <a:rPr dirty="0"/>
               <a:t>*</a:t>
             </a:r>
           </a:p>
@@ -4727,6 +5431,7 @@
               </a:defRPr>
             </a:pPr>
             <a:r>
+              <a:rPr dirty="0"/>
               <a:t>As permitted by your hardware and OS</a:t>
             </a:r>
           </a:p>
@@ -4818,7 +5523,7 @@
 </p:sld>
 </file>
 
-<file path=ppt/slides/slide5.xml><?xml version="1.0" encoding="utf-8"?>
+<file path=ppt/slides/slide6.xml><?xml version="1.0" encoding="utf-8"?>
 <p:sld xmlns:a="http://schemas.openxmlformats.org/drawingml/2006/main" xmlns:r="http://schemas.openxmlformats.org/officeDocument/2006/relationships" xmlns:p="http://schemas.openxmlformats.org/presentationml/2006/main">
   <p:cSld>
     <p:bg>
@@ -5240,15 +5945,201 @@
           </a:p>
         </p:txBody>
       </p:sp>
+      <p:sp>
+        <p:nvSpPr>
+          <p:cNvPr id="10" name="TextBox 9">
+            <a:extLst>
+              <a:ext uri="{FF2B5EF4-FFF2-40B4-BE49-F238E27FC236}">
+                <a16:creationId xmlns:a16="http://schemas.microsoft.com/office/drawing/2014/main" id="{6DD212BF-20CF-3932-584F-B3470E35065C}"/>
+              </a:ext>
+            </a:extLst>
+          </p:cNvPr>
+          <p:cNvSpPr txBox="1"/>
+          <p:nvPr/>
+        </p:nvSpPr>
+        <p:spPr>
+          <a:xfrm>
+            <a:off x="4718987" y="2148840"/>
+            <a:ext cx="457200" cy="457200"/>
+          </a:xfrm>
+          <a:prstGeom prst="rect">
+            <a:avLst/>
+          </a:prstGeom>
+          <a:noFill/>
+        </p:spPr>
+        <p:txBody>
+          <a:bodyPr wrap="none">
+            <a:spAutoFit/>
+          </a:bodyPr>
+          <a:lstStyle/>
+          <a:p>
+            <a:pPr>
+              <a:defRPr sz="3600" b="1">
+                <a:solidFill>
+                  <a:srgbClr val="FFC107"/>
+                </a:solidFill>
+              </a:defRPr>
+            </a:pPr>
+            <a:r>
+              <a:rPr dirty="0"/>
+              <a:t>*</a:t>
+            </a:r>
+          </a:p>
+        </p:txBody>
+      </p:sp>
+      <p:sp>
+        <p:nvSpPr>
+          <p:cNvPr id="11" name="Rounded Rectangle 10">
+            <a:extLst>
+              <a:ext uri="{FF2B5EF4-FFF2-40B4-BE49-F238E27FC236}">
+                <a16:creationId xmlns:a16="http://schemas.microsoft.com/office/drawing/2014/main" id="{C0B844AF-AF7E-7014-C48A-591C39B19471}"/>
+              </a:ext>
+            </a:extLst>
+          </p:cNvPr>
+          <p:cNvSpPr/>
+          <p:nvPr/>
+        </p:nvSpPr>
+        <p:spPr>
+          <a:xfrm>
+            <a:off x="6867446" y="4480560"/>
+            <a:ext cx="4867049" cy="731520"/>
+          </a:xfrm>
+          <a:prstGeom prst="roundRect">
+            <a:avLst/>
+          </a:prstGeom>
+          <a:solidFill>
+            <a:srgbClr val="D0E8F8"/>
+          </a:solidFill>
+          <a:ln w="38100">
+            <a:solidFill>
+              <a:srgbClr val="FFC107"/>
+            </a:solidFill>
+          </a:ln>
+        </p:spPr>
+        <p:style>
+          <a:lnRef idx="1">
+            <a:schemeClr val="accent1"/>
+          </a:lnRef>
+          <a:fillRef idx="3">
+            <a:schemeClr val="accent1"/>
+          </a:fillRef>
+          <a:effectRef idx="2">
+            <a:schemeClr val="accent1"/>
+          </a:effectRef>
+          <a:fontRef idx="minor">
+            <a:schemeClr val="lt1"/>
+          </a:fontRef>
+        </p:style>
+        <p:txBody>
+          <a:bodyPr wrap="square" rtlCol="0" anchor="ctr"/>
+          <a:lstStyle/>
+          <a:p>
+            <a:pPr algn="ctr">
+              <a:defRPr sz="2000">
+                <a:solidFill>
+                  <a:srgbClr val="1A235B"/>
+                </a:solidFill>
+              </a:defRPr>
+            </a:pPr>
+            <a:r>
+              <a:rPr lang="en-US" dirty="0"/>
+              <a:t>AI doesn’t remember I asked to </a:t>
+            </a:r>
+            <a:r>
+              <a:rPr lang="en-US"/>
+              <a:t>disable H</a:t>
+            </a:r>
+            <a:endParaRPr dirty="0"/>
+          </a:p>
+        </p:txBody>
+      </p:sp>
     </p:spTree>
   </p:cSld>
   <p:clrMapOvr>
     <a:masterClrMapping/>
   </p:clrMapOvr>
+  <p:timing>
+    <p:tnLst>
+      <p:par>
+        <p:cTn id="1" dur="indefinite" restart="never" nodeType="tmRoot">
+          <p:childTnLst>
+            <p:seq concurrent="1" nextAc="seek">
+              <p:cTn id="2" dur="indefinite" nodeType="mainSeq">
+                <p:childTnLst>
+                  <p:par>
+                    <p:cTn id="3" fill="hold">
+                      <p:stCondLst>
+                        <p:cond delay="indefinite"/>
+                      </p:stCondLst>
+                      <p:childTnLst>
+                        <p:par>
+                          <p:cTn id="4" fill="hold">
+                            <p:stCondLst>
+                              <p:cond delay="0"/>
+                            </p:stCondLst>
+                            <p:childTnLst>
+                              <p:par>
+                                <p:cTn id="5" presetID="1" presetClass="entr" presetSubtype="0" fill="hold" grpId="0" nodeType="clickEffect">
+                                  <p:stCondLst>
+                                    <p:cond delay="0"/>
+                                  </p:stCondLst>
+                                  <p:childTnLst>
+                                    <p:set>
+                                      <p:cBhvr>
+                                        <p:cTn id="6" dur="1" fill="hold">
+                                          <p:stCondLst>
+                                            <p:cond delay="0"/>
+                                          </p:stCondLst>
+                                        </p:cTn>
+                                        <p:tgtEl>
+                                          <p:spTgt spid="11"/>
+                                        </p:tgtEl>
+                                        <p:attrNameLst>
+                                          <p:attrName>style.visibility</p:attrName>
+                                        </p:attrNameLst>
+                                      </p:cBhvr>
+                                      <p:to>
+                                        <p:strVal val="visible"/>
+                                      </p:to>
+                                    </p:set>
+                                  </p:childTnLst>
+                                </p:cTn>
+                              </p:par>
+                            </p:childTnLst>
+                          </p:cTn>
+                        </p:par>
+                      </p:childTnLst>
+                    </p:cTn>
+                  </p:par>
+                </p:childTnLst>
+              </p:cTn>
+              <p:prevCondLst>
+                <p:cond evt="onPrev" delay="0">
+                  <p:tgtEl>
+                    <p:sldTgt/>
+                  </p:tgtEl>
+                </p:cond>
+              </p:prevCondLst>
+              <p:nextCondLst>
+                <p:cond evt="onNext" delay="0">
+                  <p:tgtEl>
+                    <p:sldTgt/>
+                  </p:tgtEl>
+                </p:cond>
+              </p:nextCondLst>
+            </p:seq>
+          </p:childTnLst>
+        </p:cTn>
+      </p:par>
+    </p:tnLst>
+    <p:bldLst>
+      <p:bldP spid="11" grpId="0" animBg="1"/>
+    </p:bldLst>
+  </p:timing>
 </p:sld>
 </file>
 
-<file path=ppt/slides/slide6.xml><?xml version="1.0" encoding="utf-8"?>
+<file path=ppt/slides/slide7.xml><?xml version="1.0" encoding="utf-8"?>
 <p:sld xmlns:a="http://schemas.openxmlformats.org/drawingml/2006/main" xmlns:r="http://schemas.openxmlformats.org/officeDocument/2006/relationships" xmlns:p="http://schemas.openxmlformats.org/presentationml/2006/main">
   <p:cSld>
     <p:bg>
@@ -5708,424 +6599,6 @@
 </p:sld>
 </file>
 
-<file path=ppt/slides/slide7.xml><?xml version="1.0" encoding="utf-8"?>
-<p:sld xmlns:a="http://schemas.openxmlformats.org/drawingml/2006/main" xmlns:r="http://schemas.openxmlformats.org/officeDocument/2006/relationships" xmlns:p="http://schemas.openxmlformats.org/presentationml/2006/main">
-  <p:cSld>
-    <p:bg>
-      <p:bgPr>
-        <a:solidFill>
-          <a:srgbClr val="1A235B"/>
-        </a:solidFill>
-        <a:effectLst/>
-      </p:bgPr>
-    </p:bg>
-    <p:spTree>
-      <p:nvGrpSpPr>
-        <p:cNvPr id="1" name=""/>
-        <p:cNvGrpSpPr/>
-        <p:nvPr/>
-      </p:nvGrpSpPr>
-      <p:grpSpPr>
-        <a:xfrm>
-          <a:off x="0" y="0"/>
-          <a:ext cx="0" cy="0"/>
-          <a:chOff x="0" y="0"/>
-          <a:chExt cx="0" cy="0"/>
-        </a:xfrm>
-      </p:grpSpPr>
-      <p:sp>
-        <p:nvSpPr>
-          <p:cNvPr id="2" name="TextBox 1"/>
-          <p:cNvSpPr txBox="1"/>
-          <p:nvPr/>
-        </p:nvSpPr>
-        <p:spPr>
-          <a:xfrm>
-            <a:off x="457200" y="274320"/>
-            <a:ext cx="11277295" cy="1097280"/>
-          </a:xfrm>
-          <a:prstGeom prst="rect">
-            <a:avLst/>
-          </a:prstGeom>
-          <a:noFill/>
-        </p:spPr>
-        <p:txBody>
-          <a:bodyPr wrap="square">
-            <a:spAutoFit/>
-          </a:bodyPr>
-          <a:lstStyle/>
-          <a:p>
-            <a:pPr algn="ctr">
-              <a:defRPr sz="4400" b="1">
-                <a:solidFill>
-                  <a:srgbClr val="FFFFFF"/>
-                </a:solidFill>
-              </a:defRPr>
-            </a:pPr>
-            <a:r>
-              <a:t>Advanced Features</a:t>
-            </a:r>
-          </a:p>
-        </p:txBody>
-      </p:sp>
-      <p:sp>
-        <p:nvSpPr>
-          <p:cNvPr id="3" name="Rectangle 2"/>
-          <p:cNvSpPr/>
-          <p:nvPr/>
-        </p:nvSpPr>
-        <p:spPr>
-          <a:xfrm>
-            <a:off x="3657600" y="914400"/>
-            <a:ext cx="4876495" cy="50800"/>
-          </a:xfrm>
-          <a:prstGeom prst="rect">
-            <a:avLst/>
-          </a:prstGeom>
-          <a:solidFill>
-            <a:srgbClr val="FFC107"/>
-          </a:solidFill>
-          <a:ln>
-            <a:noFill/>
-          </a:ln>
-        </p:spPr>
-        <p:style>
-          <a:lnRef idx="1">
-            <a:schemeClr val="accent1"/>
-          </a:lnRef>
-          <a:fillRef idx="3">
-            <a:schemeClr val="accent1"/>
-          </a:fillRef>
-          <a:effectRef idx="2">
-            <a:schemeClr val="accent1"/>
-          </a:effectRef>
-          <a:fontRef idx="minor">
-            <a:schemeClr val="lt1"/>
-          </a:fontRef>
-        </p:style>
-        <p:txBody>
-          <a:bodyPr rtlCol="0" anchor="ctr"/>
-          <a:lstStyle/>
-          <a:p>
-            <a:pPr algn="ctr"/>
-            <a:endParaRPr/>
-          </a:p>
-        </p:txBody>
-      </p:sp>
-      <p:sp>
-        <p:nvSpPr>
-          <p:cNvPr id="4" name="TextBox 3"/>
-          <p:cNvSpPr txBox="1"/>
-          <p:nvPr/>
-        </p:nvSpPr>
-        <p:spPr>
-          <a:xfrm>
-            <a:off x="685800" y="1280160"/>
-            <a:ext cx="5029200" cy="548640"/>
-          </a:xfrm>
-          <a:prstGeom prst="rect">
-            <a:avLst/>
-          </a:prstGeom>
-          <a:noFill/>
-        </p:spPr>
-        <p:txBody>
-          <a:bodyPr wrap="none">
-            <a:spAutoFit/>
-          </a:bodyPr>
-          <a:lstStyle/>
-          <a:p>
-            <a:pPr>
-              <a:defRPr sz="2800" b="1">
-                <a:solidFill>
-                  <a:srgbClr val="FFC107"/>
-                </a:solidFill>
-              </a:defRPr>
-            </a:pPr>
-            <a:r>
-              <a:t>Astronomical Overlays</a:t>
-            </a:r>
-          </a:p>
-        </p:txBody>
-      </p:sp>
-      <p:sp>
-        <p:nvSpPr>
-          <p:cNvPr id="5" name="TextBox 4"/>
-          <p:cNvSpPr txBox="1"/>
-          <p:nvPr/>
-        </p:nvSpPr>
-        <p:spPr>
-          <a:xfrm>
-            <a:off x="685800" y="1828800"/>
-            <a:ext cx="10515600" cy="4572000"/>
-          </a:xfrm>
-          <a:prstGeom prst="rect">
-            <a:avLst/>
-          </a:prstGeom>
-          <a:noFill/>
-        </p:spPr>
-        <p:txBody>
-          <a:bodyPr wrap="square">
-            <a:spAutoFit/>
-          </a:bodyPr>
-          <a:lstStyle/>
-          <a:p>
-            <a:pPr>
-              <a:defRPr sz="2200">
-                <a:solidFill>
-                  <a:srgbClr val="FFFFFF"/>
-                </a:solidFill>
-              </a:defRPr>
-            </a:pPr>
-            <a:r>
-              <a:t>  IAU constellation boundaries</a:t>
-            </a:r>
-          </a:p>
-          <a:p>
-            <a:pPr>
-              <a:defRPr sz="2200">
-                <a:solidFill>
-                  <a:srgbClr val="FFFFFF"/>
-                </a:solidFill>
-              </a:defRPr>
-            </a:pPr>
-            <a:r>
-              <a:t>  Bright star catalog</a:t>
-            </a:r>
-          </a:p>
-          <a:p>
-            <a:pPr>
-              <a:defRPr sz="2200">
-                <a:solidFill>
-                  <a:srgbClr val="FFFFFF"/>
-                </a:solidFill>
-              </a:defRPr>
-            </a:pPr>
-            <a:r>
-              <a:t>  Ecliptic and Galactic planes</a:t>
-            </a:r>
-          </a:p>
-          <a:p>
-            <a:pPr>
-              <a:defRPr sz="2200">
-                <a:solidFill>
-                  <a:srgbClr val="FFFFFF"/>
-                </a:solidFill>
-              </a:defRPr>
-            </a:pPr>
-            <a:r>
-              <a:t>  Observer horizon &amp; twilight</a:t>
-            </a:r>
-          </a:p>
-        </p:txBody>
-      </p:sp>
-      <p:sp>
-        <p:nvSpPr>
-          <p:cNvPr id="6" name="TextBox 5"/>
-          <p:cNvSpPr txBox="1"/>
-          <p:nvPr/>
-        </p:nvSpPr>
-        <p:spPr>
-          <a:xfrm>
-            <a:off x="6400800" y="1280160"/>
-            <a:ext cx="5029200" cy="548640"/>
-          </a:xfrm>
-          <a:prstGeom prst="rect">
-            <a:avLst/>
-          </a:prstGeom>
-          <a:noFill/>
-        </p:spPr>
-        <p:txBody>
-          <a:bodyPr wrap="none">
-            <a:spAutoFit/>
-          </a:bodyPr>
-          <a:lstStyle/>
-          <a:p>
-            <a:pPr>
-              <a:defRPr sz="2800" b="1">
-                <a:solidFill>
-                  <a:srgbClr val="FFC107"/>
-                </a:solidFill>
-              </a:defRPr>
-            </a:pPr>
-            <a:r>
-              <a:t>Catalog Comparison</a:t>
-            </a:r>
-          </a:p>
-        </p:txBody>
-      </p:sp>
-      <p:sp>
-        <p:nvSpPr>
-          <p:cNvPr id="7" name="TextBox 6"/>
-          <p:cNvSpPr txBox="1"/>
-          <p:nvPr/>
-        </p:nvSpPr>
-        <p:spPr>
-          <a:xfrm>
-            <a:off x="6400800" y="1828800"/>
-            <a:ext cx="10515600" cy="4572000"/>
-          </a:xfrm>
-          <a:prstGeom prst="rect">
-            <a:avLst/>
-          </a:prstGeom>
-          <a:noFill/>
-        </p:spPr>
-        <p:txBody>
-          <a:bodyPr wrap="square">
-            <a:spAutoFit/>
-          </a:bodyPr>
-          <a:lstStyle/>
-          <a:p>
-            <a:pPr>
-              <a:defRPr sz="2200">
-                <a:solidFill>
-                  <a:srgbClr val="FFFFFF"/>
-                </a:solidFill>
-              </a:defRPr>
-            </a:pPr>
-            <a:r>
-              <a:t>  Load alternate catalog versions</a:t>
-            </a:r>
-          </a:p>
-          <a:p>
-            <a:pPr>
-              <a:defRPr sz="2200">
-                <a:solidFill>
-                  <a:srgbClr val="FFFFFF"/>
-                </a:solidFill>
-              </a:defRPr>
-            </a:pPr>
-            <a:r>
-              <a:t>  Blink between catalogs</a:t>
-            </a:r>
-          </a:p>
-          <a:p>
-            <a:pPr>
-              <a:defRPr sz="2200">
-                <a:solidFill>
-                  <a:srgbClr val="FFFFFF"/>
-                </a:solidFill>
-              </a:defRPr>
-            </a:pPr>
-            <a:r>
-              <a:t>  View new/deleted/changed objects</a:t>
-            </a:r>
-          </a:p>
-          <a:p>
-            <a:pPr>
-              <a:defRPr sz="2200">
-                <a:solidFill>
-                  <a:srgbClr val="FFFFFF"/>
-                </a:solidFill>
-              </a:defRPr>
-            </a:pPr>
-            <a:r>
-              <a:t>  Pre-computed position cache</a:t>
-            </a:r>
-          </a:p>
-        </p:txBody>
-      </p:sp>
-      <p:sp>
-        <p:nvSpPr>
-          <p:cNvPr id="8" name="TextBox 7"/>
-          <p:cNvSpPr txBox="1"/>
-          <p:nvPr/>
-        </p:nvSpPr>
-        <p:spPr>
-          <a:xfrm>
-            <a:off x="685800" y="4114800"/>
-            <a:ext cx="10515600" cy="548640"/>
-          </a:xfrm>
-          <a:prstGeom prst="rect">
-            <a:avLst/>
-          </a:prstGeom>
-          <a:noFill/>
-        </p:spPr>
-        <p:txBody>
-          <a:bodyPr wrap="none">
-            <a:spAutoFit/>
-          </a:bodyPr>
-          <a:lstStyle/>
-          <a:p>
-            <a:pPr>
-              <a:defRPr sz="2800" b="1">
-                <a:solidFill>
-                  <a:srgbClr val="FFC107"/>
-                </a:solidFill>
-              </a:defRPr>
-            </a:pPr>
-            <a:r>
-              <a:t>Interactive Features</a:t>
-            </a:r>
-          </a:p>
-        </p:txBody>
-      </p:sp>
-      <p:sp>
-        <p:nvSpPr>
-          <p:cNvPr id="9" name="TextBox 8"/>
-          <p:cNvSpPr txBox="1"/>
-          <p:nvPr/>
-        </p:nvSpPr>
-        <p:spPr>
-          <a:xfrm>
-            <a:off x="685800" y="4663440"/>
-            <a:ext cx="10515600" cy="4572000"/>
-          </a:xfrm>
-          <a:prstGeom prst="rect">
-            <a:avLst/>
-          </a:prstGeom>
-          <a:noFill/>
-        </p:spPr>
-        <p:txBody>
-          <a:bodyPr wrap="square">
-            <a:spAutoFit/>
-          </a:bodyPr>
-          <a:lstStyle/>
-          <a:p>
-            <a:pPr>
-              <a:defRPr sz="2200">
-                <a:solidFill>
-                  <a:srgbClr val="8AB4D9"/>
-                </a:solidFill>
-              </a:defRPr>
-            </a:pPr>
-            <a:r>
-              <a:t>  Click any NEO for detailed orbital elements and discovery info</a:t>
-            </a:r>
-          </a:p>
-          <a:p>
-            <a:pPr>
-              <a:defRPr sz="2200">
-                <a:solidFill>
-                  <a:srgbClr val="8AB4D9"/>
-                </a:solidFill>
-              </a:defRPr>
-            </a:pPr>
-            <a:r>
-              <a:t>  Shift+Click for constellation ID</a:t>
-            </a:r>
-          </a:p>
-          <a:p>
-            <a:pPr>
-              <a:defRPr sz="2200">
-                <a:solidFill>
-                  <a:srgbClr val="8AB4D9"/>
-                </a:solidFill>
-              </a:defRPr>
-            </a:pPr>
-            <a:r>
-              <a:t>  Sortable data tables with CSV export</a:t>
-            </a:r>
-          </a:p>
-        </p:txBody>
-      </p:sp>
-    </p:spTree>
-  </p:cSld>
-  <p:clrMapOvr>
-    <a:masterClrMapping/>
-  </p:clrMapOvr>
-</p:sld>
-</file>
-
 <file path=ppt/slides/slide8.xml><?xml version="1.0" encoding="utf-8"?>
 <p:sld xmlns:a="http://schemas.openxmlformats.org/drawingml/2006/main" xmlns:r="http://schemas.openxmlformats.org/officeDocument/2006/relationships" xmlns:p="http://schemas.openxmlformats.org/presentationml/2006/main">
   <p:cSld>
@@ -6181,7 +6654,7 @@
               </a:defRPr>
             </a:pPr>
             <a:r>
-              <a:t>Performance Architecture</a:t>
+              <a:t>Advanced Features</a:t>
             </a:r>
           </a:p>
         </p:txBody>
@@ -6238,8 +6711,8 @@
         </p:nvSpPr>
         <p:spPr>
           <a:xfrm>
-            <a:off x="685800" y="1371600"/>
-            <a:ext cx="10515600" cy="4572000"/>
+            <a:off x="685800" y="1280160"/>
+            <a:ext cx="5029200" cy="548640"/>
           </a:xfrm>
           <a:prstGeom prst="rect">
             <a:avLst/>
@@ -6247,56 +6720,20 @@
           <a:noFill/>
         </p:spPr>
         <p:txBody>
-          <a:bodyPr wrap="square">
+          <a:bodyPr wrap="none">
             <a:spAutoFit/>
           </a:bodyPr>
           <a:lstStyle/>
           <a:p>
             <a:pPr>
-              <a:defRPr sz="2400">
-                <a:solidFill>
-                  <a:srgbClr val="FFFFFF"/>
-                </a:solidFill>
-              </a:defRPr>
-            </a:pPr>
-            <a:r>
-              <a:t>  HDF5 position cache with variable precision tiers</a:t>
-            </a:r>
-          </a:p>
-          <a:p>
-            <a:pPr>
-              <a:defRPr sz="2400">
-                <a:solidFill>
-                  <a:srgbClr val="FFFFFF"/>
-                </a:solidFill>
-              </a:defRPr>
-            </a:pPr>
-            <a:r>
-              <a:t>     - High precision (daily) for current year</a:t>
-            </a:r>
-          </a:p>
-          <a:p>
-            <a:pPr>
-              <a:defRPr sz="2400">
-                <a:solidFill>
-                  <a:srgbClr val="FFFFFF"/>
-                </a:solidFill>
-              </a:defRPr>
-            </a:pPr>
-            <a:r>
-              <a:t>     - Medium precision (weekly) for ±5 years</a:t>
-            </a:r>
-          </a:p>
-          <a:p>
-            <a:pPr>
-              <a:defRPr sz="2400">
-                <a:solidFill>
-                  <a:srgbClr val="FFFFFF"/>
-                </a:solidFill>
-              </a:defRPr>
-            </a:pPr>
-            <a:r>
-              <a:t>     - Low precision (monthly) for extended range</a:t>
+              <a:defRPr sz="2800" b="1">
+                <a:solidFill>
+                  <a:srgbClr val="FFC107"/>
+                </a:solidFill>
+              </a:defRPr>
+            </a:pPr>
+            <a:r>
+              <a:t>Astronomical Overlays</a:t>
             </a:r>
           </a:p>
         </p:txBody>
@@ -6309,7 +6746,7 @@
         </p:nvSpPr>
         <p:spPr>
           <a:xfrm>
-            <a:off x="685800" y="3108960"/>
+            <a:off x="685800" y="1828800"/>
             <a:ext cx="10515600" cy="4572000"/>
           </a:xfrm>
           <a:prstGeom prst="rect">
@@ -6324,62 +6761,250 @@
           <a:lstStyle/>
           <a:p>
             <a:pPr>
-              <a:lnSpc>
-                <a:spcPct val="150000"/>
-              </a:lnSpc>
-              <a:defRPr sz="2400">
+              <a:defRPr sz="2200">
                 <a:solidFill>
                   <a:srgbClr val="FFFFFF"/>
                 </a:solidFill>
               </a:defRPr>
             </a:pPr>
             <a:r>
-              <a:t>  ~10 FPS sustained for 40,000+ objects</a:t>
+              <a:t>  IAU constellation boundaries</a:t>
             </a:r>
           </a:p>
           <a:p>
             <a:pPr>
-              <a:lnSpc>
-                <a:spcPct val="150000"/>
-              </a:lnSpc>
-              <a:defRPr sz="2400">
+              <a:defRPr sz="2200">
                 <a:solidFill>
                   <a:srgbClr val="FFFFFF"/>
                 </a:solidFill>
               </a:defRPr>
             </a:pPr>
             <a:r>
-              <a:t>  Magnitude hysteresis reduces visual twinkling</a:t>
+              <a:t>  Bright star catalog</a:t>
             </a:r>
           </a:p>
           <a:p>
             <a:pPr>
-              <a:lnSpc>
-                <a:spcPct val="150000"/>
-              </a:lnSpc>
-              <a:defRPr sz="2400">
+              <a:defRPr sz="2200">
                 <a:solidFill>
                   <a:srgbClr val="FFFFFF"/>
                 </a:solidFill>
               </a:defRPr>
             </a:pPr>
             <a:r>
-              <a:t>  Efficient LineCollection for boundary rendering</a:t>
+              <a:t>  Ecliptic and Galactic planes</a:t>
             </a:r>
           </a:p>
           <a:p>
             <a:pPr>
-              <a:lnSpc>
-                <a:spcPct val="150000"/>
-              </a:lnSpc>
-              <a:defRPr sz="2400">
+              <a:defRPr sz="2200">
                 <a:solidFill>
                   <a:srgbClr val="FFFFFF"/>
                 </a:solidFill>
               </a:defRPr>
             </a:pPr>
             <a:r>
-              <a:t>  SQLite database via SQLAlchemy ORM</a:t>
+              <a:t>  Observer horizon &amp; twilight</a:t>
+            </a:r>
+          </a:p>
+        </p:txBody>
+      </p:sp>
+      <p:sp>
+        <p:nvSpPr>
+          <p:cNvPr id="6" name="TextBox 5"/>
+          <p:cNvSpPr txBox="1"/>
+          <p:nvPr/>
+        </p:nvSpPr>
+        <p:spPr>
+          <a:xfrm>
+            <a:off x="6400800" y="1280160"/>
+            <a:ext cx="5029200" cy="548640"/>
+          </a:xfrm>
+          <a:prstGeom prst="rect">
+            <a:avLst/>
+          </a:prstGeom>
+          <a:noFill/>
+        </p:spPr>
+        <p:txBody>
+          <a:bodyPr wrap="none">
+            <a:spAutoFit/>
+          </a:bodyPr>
+          <a:lstStyle/>
+          <a:p>
+            <a:pPr>
+              <a:defRPr sz="2800" b="1">
+                <a:solidFill>
+                  <a:srgbClr val="FFC107"/>
+                </a:solidFill>
+              </a:defRPr>
+            </a:pPr>
+            <a:r>
+              <a:t>Catalog Comparison</a:t>
+            </a:r>
+          </a:p>
+        </p:txBody>
+      </p:sp>
+      <p:sp>
+        <p:nvSpPr>
+          <p:cNvPr id="7" name="TextBox 6"/>
+          <p:cNvSpPr txBox="1"/>
+          <p:nvPr/>
+        </p:nvSpPr>
+        <p:spPr>
+          <a:xfrm>
+            <a:off x="6400800" y="1828800"/>
+            <a:ext cx="10515600" cy="4572000"/>
+          </a:xfrm>
+          <a:prstGeom prst="rect">
+            <a:avLst/>
+          </a:prstGeom>
+          <a:noFill/>
+        </p:spPr>
+        <p:txBody>
+          <a:bodyPr wrap="square">
+            <a:spAutoFit/>
+          </a:bodyPr>
+          <a:lstStyle/>
+          <a:p>
+            <a:pPr>
+              <a:defRPr sz="2200">
+                <a:solidFill>
+                  <a:srgbClr val="FFFFFF"/>
+                </a:solidFill>
+              </a:defRPr>
+            </a:pPr>
+            <a:r>
+              <a:t>  Load alternate catalog versions</a:t>
+            </a:r>
+          </a:p>
+          <a:p>
+            <a:pPr>
+              <a:defRPr sz="2200">
+                <a:solidFill>
+                  <a:srgbClr val="FFFFFF"/>
+                </a:solidFill>
+              </a:defRPr>
+            </a:pPr>
+            <a:r>
+              <a:t>  Blink between catalogs</a:t>
+            </a:r>
+          </a:p>
+          <a:p>
+            <a:pPr>
+              <a:defRPr sz="2200">
+                <a:solidFill>
+                  <a:srgbClr val="FFFFFF"/>
+                </a:solidFill>
+              </a:defRPr>
+            </a:pPr>
+            <a:r>
+              <a:t>  View new/deleted/changed objects</a:t>
+            </a:r>
+          </a:p>
+          <a:p>
+            <a:pPr>
+              <a:defRPr sz="2200">
+                <a:solidFill>
+                  <a:srgbClr val="FFFFFF"/>
+                </a:solidFill>
+              </a:defRPr>
+            </a:pPr>
+            <a:r>
+              <a:t>  Pre-computed position cache</a:t>
+            </a:r>
+          </a:p>
+        </p:txBody>
+      </p:sp>
+      <p:sp>
+        <p:nvSpPr>
+          <p:cNvPr id="8" name="TextBox 7"/>
+          <p:cNvSpPr txBox="1"/>
+          <p:nvPr/>
+        </p:nvSpPr>
+        <p:spPr>
+          <a:xfrm>
+            <a:off x="685800" y="4114800"/>
+            <a:ext cx="10515600" cy="548640"/>
+          </a:xfrm>
+          <a:prstGeom prst="rect">
+            <a:avLst/>
+          </a:prstGeom>
+          <a:noFill/>
+        </p:spPr>
+        <p:txBody>
+          <a:bodyPr wrap="none">
+            <a:spAutoFit/>
+          </a:bodyPr>
+          <a:lstStyle/>
+          <a:p>
+            <a:pPr>
+              <a:defRPr sz="2800" b="1">
+                <a:solidFill>
+                  <a:srgbClr val="FFC107"/>
+                </a:solidFill>
+              </a:defRPr>
+            </a:pPr>
+            <a:r>
+              <a:t>Interactive Features</a:t>
+            </a:r>
+          </a:p>
+        </p:txBody>
+      </p:sp>
+      <p:sp>
+        <p:nvSpPr>
+          <p:cNvPr id="9" name="TextBox 8"/>
+          <p:cNvSpPr txBox="1"/>
+          <p:nvPr/>
+        </p:nvSpPr>
+        <p:spPr>
+          <a:xfrm>
+            <a:off x="685800" y="4663440"/>
+            <a:ext cx="10515600" cy="4572000"/>
+          </a:xfrm>
+          <a:prstGeom prst="rect">
+            <a:avLst/>
+          </a:prstGeom>
+          <a:noFill/>
+        </p:spPr>
+        <p:txBody>
+          <a:bodyPr wrap="square">
+            <a:spAutoFit/>
+          </a:bodyPr>
+          <a:lstStyle/>
+          <a:p>
+            <a:pPr>
+              <a:defRPr sz="2200">
+                <a:solidFill>
+                  <a:srgbClr val="8AB4D9"/>
+                </a:solidFill>
+              </a:defRPr>
+            </a:pPr>
+            <a:r>
+              <a:t>  Click any NEO for detailed orbital elements and discovery info</a:t>
+            </a:r>
+          </a:p>
+          <a:p>
+            <a:pPr>
+              <a:defRPr sz="2200">
+                <a:solidFill>
+                  <a:srgbClr val="8AB4D9"/>
+                </a:solidFill>
+              </a:defRPr>
+            </a:pPr>
+            <a:r>
+              <a:t>  Shift+Click for constellation ID</a:t>
+            </a:r>
+          </a:p>
+          <a:p>
+            <a:pPr>
+              <a:defRPr sz="2200">
+                <a:solidFill>
+                  <a:srgbClr val="8AB4D9"/>
+                </a:solidFill>
+              </a:defRPr>
+            </a:pPr>
+            <a:r>
+              <a:t>  Sortable data tables with CSV export</a:t>
             </a:r>
           </a:p>
         </p:txBody>
@@ -6447,7 +7072,7 @@
               </a:defRPr>
             </a:pPr>
             <a:r>
-              <a:t>Future Directions</a:t>
+              <a:t>Performance Architecture</a:t>
             </a:r>
           </a:p>
         </p:txBody>
@@ -6519,32 +7144,88 @@
           <a:lstStyle/>
           <a:p>
             <a:pPr>
-              <a:lnSpc>
-                <a:spcPct val="150000"/>
-              </a:lnSpc>
-              <a:defRPr sz="2600">
+              <a:defRPr sz="2400">
                 <a:solidFill>
                   <a:srgbClr val="FFFFFF"/>
                 </a:solidFill>
               </a:defRPr>
             </a:pPr>
             <a:r>
-              <a:t>  NEOfixer integration</a:t>
-            </a:r>
-          </a:p>
+              <a:t>  HDF5 position cache with variable precision tiers</a:t>
+            </a:r>
+          </a:p>
+          <a:p>
+            <a:pPr>
+              <a:defRPr sz="2400">
+                <a:solidFill>
+                  <a:srgbClr val="FFFFFF"/>
+                </a:solidFill>
+              </a:defRPr>
+            </a:pPr>
+            <a:r>
+              <a:t>     - High precision (daily) for current year</a:t>
+            </a:r>
+          </a:p>
+          <a:p>
+            <a:pPr>
+              <a:defRPr sz="2400">
+                <a:solidFill>
+                  <a:srgbClr val="FFFFFF"/>
+                </a:solidFill>
+              </a:defRPr>
+            </a:pPr>
+            <a:r>
+              <a:t>     - Medium precision (weekly) for ±5 years</a:t>
+            </a:r>
+          </a:p>
+          <a:p>
+            <a:pPr>
+              <a:defRPr sz="2400">
+                <a:solidFill>
+                  <a:srgbClr val="FFFFFF"/>
+                </a:solidFill>
+              </a:defRPr>
+            </a:pPr>
+            <a:r>
+              <a:t>     - Low precision (monthly) for extended range</a:t>
+            </a:r>
+          </a:p>
+        </p:txBody>
+      </p:sp>
+      <p:sp>
+        <p:nvSpPr>
+          <p:cNvPr id="5" name="TextBox 4"/>
+          <p:cNvSpPr txBox="1"/>
+          <p:nvPr/>
+        </p:nvSpPr>
+        <p:spPr>
+          <a:xfrm>
+            <a:off x="685800" y="3108960"/>
+            <a:ext cx="10515600" cy="4572000"/>
+          </a:xfrm>
+          <a:prstGeom prst="rect">
+            <a:avLst/>
+          </a:prstGeom>
+          <a:noFill/>
+        </p:spPr>
+        <p:txBody>
+          <a:bodyPr wrap="square">
+            <a:spAutoFit/>
+          </a:bodyPr>
+          <a:lstStyle/>
           <a:p>
             <a:pPr>
               <a:lnSpc>
                 <a:spcPct val="150000"/>
               </a:lnSpc>
-              <a:defRPr sz="2600">
+              <a:defRPr sz="2400">
                 <a:solidFill>
                   <a:srgbClr val="FFFFFF"/>
                 </a:solidFill>
               </a:defRPr>
             </a:pPr>
             <a:r>
-              <a:t>     - Additional observational planning modes</a:t>
+              <a:t>  ~10 FPS sustained for 40,000+ objects</a:t>
             </a:r>
           </a:p>
           <a:p>
@@ -6552,14 +7233,14 @@
               <a:lnSpc>
                 <a:spcPct val="150000"/>
               </a:lnSpc>
-              <a:defRPr sz="2600">
+              <a:defRPr sz="2400">
                 <a:solidFill>
                   <a:srgbClr val="FFFFFF"/>
                 </a:solidFill>
               </a:defRPr>
             </a:pPr>
             <a:r>
-              <a:t>  Performance optimization for 100,000+ NEOs (catalog growing rapidly)</a:t>
+              <a:t>  Magnitude hysteresis reduces visual twinkling</a:t>
             </a:r>
           </a:p>
           <a:p>
@@ -6567,14 +7248,14 @@
               <a:lnSpc>
                 <a:spcPct val="150000"/>
               </a:lnSpc>
-              <a:defRPr sz="2600">
+              <a:defRPr sz="2400">
                 <a:solidFill>
                   <a:srgbClr val="FFFFFF"/>
                 </a:solidFill>
               </a:defRPr>
             </a:pPr>
             <a:r>
-              <a:t>  Database schema normalization as features expand</a:t>
+              <a:t>  Efficient LineCollection for boundary rendering</a:t>
             </a:r>
           </a:p>
           <a:p>
@@ -6582,49 +7263,14 @@
               <a:lnSpc>
                 <a:spcPct val="150000"/>
               </a:lnSpc>
-              <a:defRPr sz="2600">
+              <a:defRPr sz="2400">
                 <a:solidFill>
                   <a:srgbClr val="FFFFFF"/>
                 </a:solidFill>
               </a:defRPr>
             </a:pPr>
             <a:r>
-              <a:t>  Community feedback and feature requests welcome</a:t>
-            </a:r>
-          </a:p>
-        </p:txBody>
-      </p:sp>
-      <p:sp>
-        <p:nvSpPr>
-          <p:cNvPr id="5" name="TextBox 4"/>
-          <p:cNvSpPr txBox="1"/>
-          <p:nvPr/>
-        </p:nvSpPr>
-        <p:spPr>
-          <a:xfrm>
-            <a:off x="685800" y="4754880"/>
-            <a:ext cx="10515600" cy="548640"/>
-          </a:xfrm>
-          <a:prstGeom prst="rect">
-            <a:avLst/>
-          </a:prstGeom>
-          <a:noFill/>
-        </p:spPr>
-        <p:txBody>
-          <a:bodyPr wrap="none">
-            <a:spAutoFit/>
-          </a:bodyPr>
-          <a:lstStyle/>
-          <a:p>
-            <a:pPr>
-              <a:defRPr sz="2400" b="1">
-                <a:solidFill>
-                  <a:srgbClr val="FFC107"/>
-                </a:solidFill>
-              </a:defRPr>
-            </a:pPr>
-            <a:r>
-              <a:t>Contact: rseaman@arizona.edu</a:t>
+              <a:t>  SQLite database via SQLAlchemy ORM</a:t>
             </a:r>
           </a:p>
         </p:txBody>

</xml_diff>